<commit_message>
Updated slides up to Lab 6
</commit_message>
<xml_diff>
--- a/data8/slides/lab2.pptx
+++ b/data8/slides/lab2.pptx
@@ -9,28 +9,37 @@
     <p:sldMasterId id="2147483699" r:id="rId5"/>
   </p:sldMasterIdLst>
   <p:notesMasterIdLst>
-    <p:notesMasterId r:id="rId22"/>
+    <p:notesMasterId r:id="rId31"/>
   </p:notesMasterIdLst>
   <p:handoutMasterIdLst>
-    <p:handoutMasterId r:id="rId23"/>
+    <p:handoutMasterId r:id="rId32"/>
   </p:handoutMasterIdLst>
   <p:sldIdLst>
     <p:sldId id="256" r:id="rId6"/>
     <p:sldId id="263" r:id="rId7"/>
-    <p:sldId id="268" r:id="rId8"/>
-    <p:sldId id="269" r:id="rId9"/>
-    <p:sldId id="271" r:id="rId10"/>
-    <p:sldId id="273" r:id="rId11"/>
-    <p:sldId id="272" r:id="rId12"/>
-    <p:sldId id="270" r:id="rId13"/>
-    <p:sldId id="275" r:id="rId14"/>
-    <p:sldId id="274" r:id="rId15"/>
-    <p:sldId id="276" r:id="rId16"/>
-    <p:sldId id="277" r:id="rId17"/>
-    <p:sldId id="278" r:id="rId18"/>
-    <p:sldId id="279" r:id="rId19"/>
-    <p:sldId id="267" r:id="rId20"/>
-    <p:sldId id="266" r:id="rId21"/>
+    <p:sldId id="280" r:id="rId8"/>
+    <p:sldId id="268" r:id="rId9"/>
+    <p:sldId id="269" r:id="rId10"/>
+    <p:sldId id="275" r:id="rId11"/>
+    <p:sldId id="271" r:id="rId12"/>
+    <p:sldId id="273" r:id="rId13"/>
+    <p:sldId id="272" r:id="rId14"/>
+    <p:sldId id="270" r:id="rId15"/>
+    <p:sldId id="274" r:id="rId16"/>
+    <p:sldId id="276" r:id="rId17"/>
+    <p:sldId id="277" r:id="rId18"/>
+    <p:sldId id="278" r:id="rId19"/>
+    <p:sldId id="279" r:id="rId20"/>
+    <p:sldId id="281" r:id="rId21"/>
+    <p:sldId id="282" r:id="rId22"/>
+    <p:sldId id="283" r:id="rId23"/>
+    <p:sldId id="284" r:id="rId24"/>
+    <p:sldId id="285" r:id="rId25"/>
+    <p:sldId id="286" r:id="rId26"/>
+    <p:sldId id="287" r:id="rId27"/>
+    <p:sldId id="288" r:id="rId28"/>
+    <p:sldId id="267" r:id="rId29"/>
+    <p:sldId id="266" r:id="rId30"/>
   </p:sldIdLst>
   <p:sldSz cx="9144000" cy="6858000" type="screen4x3"/>
   <p:notesSz cx="6858000" cy="9144000"/>
@@ -214,7 +223,7 @@
           <a:p>
             <a:fld id="{97CB1905-1EEB-6545-B5E2-B70E8868255E}" type="datetimeFigureOut">
               <a:rPr lang="en-US" smtClean="0"/>
-              <a:t>7/7/2019</a:t>
+              <a:t>9/2/2019</a:t>
             </a:fld>
             <a:endParaRPr lang="en-US"/>
           </a:p>
@@ -380,7 +389,7 @@
           <a:p>
             <a:fld id="{5F53F6BF-7462-9046-A2B6-90C29244BD27}" type="datetimeFigureOut">
               <a:rPr lang="en-US" smtClean="0"/>
-              <a:t>7/7/2019</a:t>
+              <a:t>9/2/2019</a:t>
             </a:fld>
             <a:endParaRPr lang="en-US"/>
           </a:p>
@@ -7664,16 +7673,7 @@
                 </a:solidFill>
                 <a:latin typeface="Avenir LT Std 45 Book" pitchFamily="34" charset="0"/>
               </a:rPr>
-              <a:t>Data 8, Lab </a:t>
-            </a:r>
-            <a:r>
-              <a:rPr lang="en-US" dirty="0" smtClean="0">
-                <a:solidFill>
-                  <a:srgbClr val="C28220"/>
-                </a:solidFill>
-                <a:latin typeface="Avenir LT Std 45 Book" pitchFamily="34" charset="0"/>
-              </a:rPr>
-              <a:t>2</a:t>
+              <a:t>Data 8, Lab 2</a:t>
             </a:r>
             <a:endParaRPr lang="en-US" dirty="0">
               <a:solidFill>
@@ -7697,12 +7697,36 @@
         <p:spPr>
           <a:xfrm>
             <a:off x="685800" y="2262431"/>
-            <a:ext cx="6400800" cy="1113590"/>
+            <a:ext cx="6400800" cy="2376244"/>
           </a:xfrm>
         </p:spPr>
         <p:txBody>
-          <a:bodyPr/>
+          <a:bodyPr>
+            <a:normAutofit lnSpcReduction="10000"/>
+          </a:bodyPr>
           <a:lstStyle/>
+          <a:p>
+            <a:r>
+              <a:rPr lang="en-US" b="1" dirty="0" smtClean="0">
+                <a:latin typeface="Avenir LT Std 45 Book" pitchFamily="34" charset="0"/>
+              </a:rPr>
+              <a:t>Causality, Expressions, and </a:t>
+            </a:r>
+            <a:r>
+              <a:rPr lang="en-US" b="1" smtClean="0">
+                <a:latin typeface="Avenir LT Std 45 Book" pitchFamily="34" charset="0"/>
+              </a:rPr>
+              <a:t>Table Operations</a:t>
+            </a:r>
+            <a:endParaRPr lang="en-US" b="1" dirty="0" smtClean="0">
+              <a:latin typeface="Avenir LT Std 45 Book" pitchFamily="34" charset="0"/>
+            </a:endParaRPr>
+          </a:p>
+          <a:p>
+            <a:endParaRPr lang="en-US" b="1" dirty="0">
+              <a:latin typeface="Avenir LT Std 45 Book" pitchFamily="34" charset="0"/>
+            </a:endParaRPr>
+          </a:p>
           <a:p>
             <a:r>
               <a:rPr lang="en-US" b="1" dirty="0" smtClean="0">
@@ -7718,6 +7742,21 @@
               </a:rPr>
               <a:t>Fall 2019</a:t>
             </a:r>
+          </a:p>
+          <a:p>
+            <a:endParaRPr lang="en-US" dirty="0">
+              <a:latin typeface="Avenir LT Std 45 Book" pitchFamily="34" charset="0"/>
+            </a:endParaRPr>
+          </a:p>
+          <a:p>
+            <a:r>
+              <a:rPr lang="en-US" dirty="0" smtClean="0">
+                <a:latin typeface="Avenir LT Std 45 Book" pitchFamily="34" charset="0"/>
+              </a:rPr>
+              <a:t>6 September 2019</a:t>
+            </a:r>
+          </a:p>
+          <a:p>
             <a:endParaRPr lang="en-US" dirty="0">
               <a:latin typeface="Avenir LT Std 45 Book" pitchFamily="34" charset="0"/>
             </a:endParaRPr>
@@ -7787,7 +7826,7 @@
               <a:rPr lang="en-CA" dirty="0" smtClean="0">
                 <a:latin typeface="+mn-lt"/>
               </a:rPr>
-              <a:t>Establishing Causality</a:t>
+              <a:t>Association vs. Causation</a:t>
             </a:r>
             <a:endParaRPr lang="en-CA" dirty="0">
               <a:latin typeface="+mn-lt"/>
@@ -7795,107 +7834,39 @@
           </a:p>
         </p:txBody>
       </p:sp>
-      <p:sp>
-        <p:nvSpPr>
-          <p:cNvPr id="3" name="Content Placeholder 2"/>
-          <p:cNvSpPr>
-            <a:spLocks noGrp="1"/>
-          </p:cNvSpPr>
+      <p:pic>
+        <p:nvPicPr>
+          <p:cNvPr id="5" name="Content Placeholder 4"/>
+          <p:cNvPicPr>
+            <a:picLocks noGrp="1" noChangeAspect="1"/>
+          </p:cNvPicPr>
           <p:nvPr>
             <p:ph idx="1"/>
           </p:nvPr>
-        </p:nvSpPr>
+        </p:nvPicPr>
+        <p:blipFill>
+          <a:blip r:embed="rId2">
+            <a:extLst>
+              <a:ext uri="{28A0092B-C50C-407E-A947-70E740481C1C}">
+                <a14:useLocalDpi xmlns:a14="http://schemas.microsoft.com/office/drawing/2010/main" val="0"/>
+              </a:ext>
+            </a:extLst>
+          </a:blip>
+          <a:stretch>
+            <a:fillRect/>
+          </a:stretch>
+        </p:blipFill>
         <p:spPr>
           <a:xfrm>
-            <a:off x="457200" y="1756947"/>
-            <a:ext cx="8286750" cy="3596103"/>
-          </a:xfrm>
-        </p:spPr>
-        <p:txBody>
-          <a:bodyPr>
-            <a:normAutofit/>
-          </a:bodyPr>
-          <a:lstStyle/>
-          <a:p>
-            <a:r>
-              <a:rPr lang="en-CA" dirty="0" smtClean="0">
-                <a:latin typeface="Avenir LT Std 45 Book" pitchFamily="34" charset="0"/>
-              </a:rPr>
-              <a:t>Treatment Group: Treatment applied </a:t>
-            </a:r>
-          </a:p>
-          <a:p>
-            <a:r>
-              <a:rPr lang="en-CA" dirty="0" smtClean="0">
-                <a:latin typeface="Avenir LT Std 45 Book" pitchFamily="34" charset="0"/>
-              </a:rPr>
-              <a:t>Control Group: Treatment not applied </a:t>
-            </a:r>
-          </a:p>
-          <a:p>
-            <a:r>
-              <a:rPr lang="en-CA" dirty="0">
-                <a:latin typeface="Avenir LT Std 45 Book" pitchFamily="34" charset="0"/>
-              </a:rPr>
-              <a:t>Example</a:t>
-            </a:r>
-            <a:r>
-              <a:rPr lang="en-CA" dirty="0" smtClean="0">
-                <a:latin typeface="Avenir LT Std 45 Book" pitchFamily="34" charset="0"/>
-              </a:rPr>
-              <a:t>: Study </a:t>
-            </a:r>
-            <a:r>
-              <a:rPr lang="en-CA" dirty="0">
-                <a:latin typeface="Avenir LT Std 45 Book" pitchFamily="34" charset="0"/>
-              </a:rPr>
-              <a:t>the effect of capital punishment on a state’s murder </a:t>
-            </a:r>
-            <a:r>
-              <a:rPr lang="en-CA" dirty="0" smtClean="0">
-                <a:latin typeface="Avenir LT Std 45 Book" pitchFamily="34" charset="0"/>
-              </a:rPr>
-              <a:t>rate</a:t>
-            </a:r>
-          </a:p>
-          <a:p>
-            <a:pPr lvl="1"/>
-            <a:r>
-              <a:rPr lang="en-CA" dirty="0" smtClean="0">
-                <a:latin typeface="Avenir LT Std 45 Book" pitchFamily="34" charset="0"/>
-              </a:rPr>
-              <a:t>Treatment Group: States with capital punishment</a:t>
-            </a:r>
-          </a:p>
-          <a:p>
-            <a:pPr lvl="1"/>
-            <a:r>
-              <a:rPr lang="en-CA" dirty="0" smtClean="0">
-                <a:latin typeface="Avenir LT Std 45 Book" pitchFamily="34" charset="0"/>
-              </a:rPr>
-              <a:t>Control Group: States without capital punishment</a:t>
-            </a:r>
-            <a:endParaRPr lang="en-CA" dirty="0">
-              <a:latin typeface="Avenir LT Std 45 Book" pitchFamily="34" charset="0"/>
-            </a:endParaRPr>
-          </a:p>
-          <a:p>
-            <a:endParaRPr lang="en-CA" dirty="0" smtClean="0">
-              <a:latin typeface="Avenir LT Std 45 Book" pitchFamily="34" charset="0"/>
-            </a:endParaRPr>
-          </a:p>
-          <a:p>
-            <a:pPr lvl="1"/>
-            <a:endParaRPr lang="en-CA" dirty="0">
-              <a:latin typeface="Avenir LT Std 45 Book" pitchFamily="34" charset="0"/>
-            </a:endParaRPr>
-          </a:p>
-        </p:txBody>
-      </p:sp>
+            <a:off x="457200" y="1921761"/>
+            <a:ext cx="8286750" cy="3266891"/>
+          </a:xfrm>
+        </p:spPr>
+      </p:pic>
     </p:spTree>
     <p:extLst>
       <p:ext uri="{BB962C8B-B14F-4D97-AF65-F5344CB8AC3E}">
-        <p14:creationId xmlns:p14="http://schemas.microsoft.com/office/powerpoint/2010/main" val="160600996"/>
+        <p14:creationId xmlns:p14="http://schemas.microsoft.com/office/powerpoint/2010/main" val="3377257628"/>
       </p:ext>
     </p:extLst>
   </p:cSld>
@@ -7989,7 +7960,7 @@
               <a:rPr lang="en-CA" dirty="0" smtClean="0">
                 <a:latin typeface="Avenir LT Std 45 Book" pitchFamily="34" charset="0"/>
               </a:rPr>
-              <a:t>Observational Study: Experimenter has no ability to divide into treatment and control groups</a:t>
+              <a:t>Treatment Group: Treatment applied </a:t>
             </a:r>
           </a:p>
           <a:p>
@@ -7997,11 +7968,8 @@
               <a:rPr lang="en-CA" dirty="0" smtClean="0">
                 <a:latin typeface="Avenir LT Std 45 Book" pitchFamily="34" charset="0"/>
               </a:rPr>
-              <a:t>Randomized Control Experiment: Randomly divide into treatment and control group</a:t>
-            </a:r>
-            <a:endParaRPr lang="en-CA" dirty="0" smtClean="0">
-              <a:latin typeface="Avenir LT Std 45 Book" pitchFamily="34" charset="0"/>
-            </a:endParaRPr>
+              <a:t>Control Group: Treatment not applied </a:t>
+            </a:r>
           </a:p>
           <a:p>
             <a:r>
@@ -8035,8 +8003,22 @@
               <a:rPr lang="en-CA" dirty="0" smtClean="0">
                 <a:latin typeface="Avenir LT Std 45 Book" pitchFamily="34" charset="0"/>
               </a:rPr>
-              <a:t>Observational study since researchers cannot just randomly decide which states have capital punishment or not</a:t>
-            </a:r>
+              <a:t>Treatment Group: States with capital punishment</a:t>
+            </a:r>
+          </a:p>
+          <a:p>
+            <a:pPr lvl="1"/>
+            <a:r>
+              <a:rPr lang="en-CA" dirty="0" smtClean="0">
+                <a:latin typeface="Avenir LT Std 45 Book" pitchFamily="34" charset="0"/>
+              </a:rPr>
+              <a:t>Control Group: States without capital punishment</a:t>
+            </a:r>
+            <a:endParaRPr lang="en-CA" dirty="0">
+              <a:latin typeface="Avenir LT Std 45 Book" pitchFamily="34" charset="0"/>
+            </a:endParaRPr>
+          </a:p>
+          <a:p>
             <a:endParaRPr lang="en-CA" dirty="0" smtClean="0">
               <a:latin typeface="Avenir LT Std 45 Book" pitchFamily="34" charset="0"/>
             </a:endParaRPr>
@@ -8052,7 +8034,7 @@
     </p:spTree>
     <p:extLst>
       <p:ext uri="{BB962C8B-B14F-4D97-AF65-F5344CB8AC3E}">
-        <p14:creationId xmlns:p14="http://schemas.microsoft.com/office/powerpoint/2010/main" val="3196583341"/>
+        <p14:creationId xmlns:p14="http://schemas.microsoft.com/office/powerpoint/2010/main" val="160600996"/>
       </p:ext>
     </p:extLst>
   </p:cSld>
@@ -8146,37 +8128,51 @@
               <a:rPr lang="en-CA" dirty="0" smtClean="0">
                 <a:latin typeface="Avenir LT Std 45 Book" pitchFamily="34" charset="0"/>
               </a:rPr>
-              <a:t>Example: Researcher test the effect of a new drug on lung cancer by giving the drug to 75% of subjects (randomly selected), and a placebo drug to the other subjects</a:t>
-            </a:r>
-          </a:p>
-          <a:p>
-            <a:pPr lvl="1"/>
+              <a:t>Observational Study: Experimenter has no ability to divide study participants into treatment and control groups</a:t>
+            </a:r>
+          </a:p>
+          <a:p>
             <a:r>
               <a:rPr lang="en-CA" dirty="0" smtClean="0">
                 <a:latin typeface="Avenir LT Std 45 Book" pitchFamily="34" charset="0"/>
               </a:rPr>
-              <a:t>Randomized control experiment since researcher randomly selected treatment and control groups</a:t>
-            </a:r>
-          </a:p>
-          <a:p>
+              <a:t>Randomized Control Experiment: Randomly divide participants into treatment and control group</a:t>
+            </a:r>
+          </a:p>
+          <a:p>
+            <a:r>
+              <a:rPr lang="en-CA" dirty="0">
+                <a:latin typeface="Avenir LT Std 45 Book" pitchFamily="34" charset="0"/>
+              </a:rPr>
+              <a:t>Example</a:t>
+            </a:r>
             <a:r>
               <a:rPr lang="en-CA" dirty="0" smtClean="0">
                 <a:latin typeface="Avenir LT Std 45 Book" pitchFamily="34" charset="0"/>
               </a:rPr>
-              <a:t>Example: Psychologist stood outside an elementary school and asked the first 100 students they saw whether the student played basketball</a:t>
-            </a:r>
-          </a:p>
-          <a:p>
-            <a:pPr lvl="1"/>
+              <a:t>: Study </a:t>
+            </a:r>
+            <a:r>
+              <a:rPr lang="en-CA" dirty="0">
+                <a:latin typeface="Avenir LT Std 45 Book" pitchFamily="34" charset="0"/>
+              </a:rPr>
+              <a:t>the effect of capital punishment on a state’s murder </a:t>
+            </a:r>
             <a:r>
               <a:rPr lang="en-CA" dirty="0" smtClean="0">
                 <a:latin typeface="Avenir LT Std 45 Book" pitchFamily="34" charset="0"/>
               </a:rPr>
-              <a:t>Observational or randomized study?</a:t>
-            </a:r>
-            <a:endParaRPr lang="en-CA" dirty="0" smtClean="0">
-              <a:latin typeface="Avenir LT Std 45 Book" pitchFamily="34" charset="0"/>
-            </a:endParaRPr>
+              <a:t>rate</a:t>
+            </a:r>
+          </a:p>
+          <a:p>
+            <a:pPr lvl="1"/>
+            <a:r>
+              <a:rPr lang="en-CA" dirty="0" smtClean="0">
+                <a:latin typeface="Avenir LT Std 45 Book" pitchFamily="34" charset="0"/>
+              </a:rPr>
+              <a:t>Observational study since researchers cannot just randomly decide which states have capital punishment or not</a:t>
+            </a:r>
           </a:p>
           <a:p>
             <a:pPr lvl="1"/>
@@ -8189,7 +8185,7 @@
     </p:spTree>
     <p:extLst>
       <p:ext uri="{BB962C8B-B14F-4D97-AF65-F5344CB8AC3E}">
-        <p14:creationId xmlns:p14="http://schemas.microsoft.com/office/powerpoint/2010/main" val="2912186225"/>
+        <p14:creationId xmlns:p14="http://schemas.microsoft.com/office/powerpoint/2010/main" val="3196583341"/>
       </p:ext>
     </p:extLst>
   </p:cSld>
@@ -8249,7 +8245,7 @@
               <a:rPr lang="en-CA" dirty="0" smtClean="0">
                 <a:latin typeface="+mn-lt"/>
               </a:rPr>
-              <a:t>Establishing Causality</a:t>
+              <a:t>Establishing Causality: Examples</a:t>
             </a:r>
             <a:endParaRPr lang="en-CA" dirty="0">
               <a:latin typeface="+mn-lt"/>
@@ -8275,7 +8271,7 @@
         </p:spPr>
         <p:txBody>
           <a:bodyPr>
-            <a:normAutofit fontScale="92500" lnSpcReduction="10000"/>
+            <a:normAutofit/>
           </a:bodyPr>
           <a:lstStyle/>
           <a:p>
@@ -8283,107 +8279,37 @@
               <a:rPr lang="en-CA" dirty="0" smtClean="0">
                 <a:latin typeface="Avenir LT Std 45 Book" pitchFamily="34" charset="0"/>
               </a:rPr>
-              <a:t>Observational Study: Cannot prove causation!!</a:t>
-            </a:r>
-          </a:p>
-          <a:p>
+              <a:t>Researcher test the effect of a new drug on lung cancer by giving the drug to 75% of participants selected at random and a placebo drug to the other subjects</a:t>
+            </a:r>
+          </a:p>
+          <a:p>
+            <a:pPr lvl="1"/>
             <a:r>
               <a:rPr lang="en-CA" dirty="0" smtClean="0">
                 <a:latin typeface="Avenir LT Std 45 Book" pitchFamily="34" charset="0"/>
               </a:rPr>
-              <a:t>Randomized Control Experiment: Can sometimes prove causation, but also other potential problems:</a:t>
-            </a:r>
-          </a:p>
-          <a:p>
-            <a:pPr lvl="1"/>
+              <a:t>Randomized control experiment since researcher randomly selected treatment and control groups</a:t>
+            </a:r>
+          </a:p>
+          <a:p>
             <a:r>
               <a:rPr lang="en-CA" dirty="0" smtClean="0">
                 <a:latin typeface="Avenir LT Std 45 Book" pitchFamily="34" charset="0"/>
               </a:rPr>
-              <a:t>Selection bias: Study’s subjects don’t represent a typical member of the population</a:t>
-            </a:r>
-          </a:p>
-          <a:p>
-            <a:pPr lvl="2"/>
+              <a:t>Psychologist stood outside an elementary school and asked the first 100 students they saw whether the student played basketball</a:t>
+            </a:r>
+          </a:p>
+          <a:p>
+            <a:pPr lvl="1"/>
             <a:r>
               <a:rPr lang="en-CA" dirty="0" smtClean="0">
                 <a:latin typeface="Avenir LT Std 45 Book" pitchFamily="34" charset="0"/>
               </a:rPr>
-              <a:t>Example: Drug trial subjects are only white males</a:t>
-            </a:r>
-          </a:p>
-          <a:p>
-            <a:pPr lvl="1"/>
-            <a:r>
-              <a:rPr lang="en-CA" dirty="0" smtClean="0">
-                <a:latin typeface="Avenir LT Std 45 Book" pitchFamily="34" charset="0"/>
-              </a:rPr>
-              <a:t>Measurement error: People don’t answer truthfully</a:t>
-            </a:r>
-          </a:p>
-          <a:p>
-            <a:pPr lvl="2"/>
-            <a:r>
-              <a:rPr lang="en-CA" dirty="0" smtClean="0">
-                <a:latin typeface="Avenir LT Std 45 Book" pitchFamily="34" charset="0"/>
-              </a:rPr>
-              <a:t>Example: Farmers may underestimate crop numbers to get more aid in a government agriculture survey</a:t>
-            </a:r>
-          </a:p>
-          <a:p>
-            <a:pPr lvl="1"/>
-            <a:r>
-              <a:rPr lang="en-CA" dirty="0" smtClean="0">
-                <a:latin typeface="Avenir LT Std 45 Book" pitchFamily="34" charset="0"/>
-              </a:rPr>
-              <a:t>Questionnaire design: Leading questions, order of questions</a:t>
-            </a:r>
-          </a:p>
-          <a:p>
-            <a:pPr lvl="2"/>
-            <a:r>
-              <a:rPr lang="en-CA" dirty="0" smtClean="0">
-                <a:latin typeface="Avenir LT Std 45 Book" pitchFamily="34" charset="0"/>
-              </a:rPr>
-              <a:t>Example: “Do you agree with America’s pointless intervention in Afghanistan?”</a:t>
-            </a:r>
-          </a:p>
-          <a:p>
-            <a:pPr lvl="1"/>
+              <a:t>Observational study since researcher doesn’t control who gets asked the question</a:t>
+            </a:r>
             <a:endParaRPr lang="en-CA" dirty="0">
               <a:latin typeface="Avenir LT Std 45 Book" pitchFamily="34" charset="0"/>
             </a:endParaRPr>
-          </a:p>
-        </p:txBody>
-      </p:sp>
-      <p:sp>
-        <p:nvSpPr>
-          <p:cNvPr id="4" name="TextBox 3"/>
-          <p:cNvSpPr txBox="1"/>
-          <p:nvPr/>
-        </p:nvSpPr>
-        <p:spPr>
-          <a:xfrm>
-            <a:off x="5543549" y="5200650"/>
-            <a:ext cx="3000375" cy="923330"/>
-          </a:xfrm>
-          <a:prstGeom prst="rect">
-            <a:avLst/>
-          </a:prstGeom>
-          <a:noFill/>
-        </p:spPr>
-        <p:txBody>
-          <a:bodyPr wrap="square" rtlCol="0">
-            <a:spAutoFit/>
-          </a:bodyPr>
-          <a:lstStyle/>
-          <a:p>
-            <a:pPr algn="r"/>
-            <a:r>
-              <a:rPr lang="en-CA" dirty="0" smtClean="0"/>
-              <a:t>Come to OH to hear more or check out Stat 152: Sampling Surveys!</a:t>
-            </a:r>
-            <a:endParaRPr lang="en-CA" dirty="0"/>
           </a:p>
         </p:txBody>
       </p:sp>
@@ -8400,9 +8326,231 @@
   <p:timing>
     <p:tnLst>
       <p:par>
-        <p:cTn id="1" dur="indefinite" restart="never" nodeType="tmRoot"/>
+        <p:cTn id="1" dur="indefinite" restart="never" nodeType="tmRoot">
+          <p:childTnLst>
+            <p:seq concurrent="1" nextAc="seek">
+              <p:cTn id="2" dur="indefinite" nodeType="mainSeq">
+                <p:childTnLst>
+                  <p:par>
+                    <p:cTn id="3" fill="hold">
+                      <p:stCondLst>
+                        <p:cond delay="indefinite"/>
+                      </p:stCondLst>
+                      <p:childTnLst>
+                        <p:par>
+                          <p:cTn id="4" fill="hold">
+                            <p:stCondLst>
+                              <p:cond delay="0"/>
+                            </p:stCondLst>
+                            <p:childTnLst>
+                              <p:par>
+                                <p:cTn id="5" presetID="1" presetClass="entr" presetSubtype="0" fill="hold" grpId="0" nodeType="clickEffect">
+                                  <p:stCondLst>
+                                    <p:cond delay="0"/>
+                                  </p:stCondLst>
+                                  <p:childTnLst>
+                                    <p:set>
+                                      <p:cBhvr>
+                                        <p:cTn id="6" dur="1" fill="hold">
+                                          <p:stCondLst>
+                                            <p:cond delay="0"/>
+                                          </p:stCondLst>
+                                        </p:cTn>
+                                        <p:tgtEl>
+                                          <p:spTgt spid="3">
+                                            <p:txEl>
+                                              <p:pRg st="0" end="0"/>
+                                            </p:txEl>
+                                          </p:spTgt>
+                                        </p:tgtEl>
+                                        <p:attrNameLst>
+                                          <p:attrName>style.visibility</p:attrName>
+                                        </p:attrNameLst>
+                                      </p:cBhvr>
+                                      <p:to>
+                                        <p:strVal val="visible"/>
+                                      </p:to>
+                                    </p:set>
+                                  </p:childTnLst>
+                                </p:cTn>
+                              </p:par>
+                            </p:childTnLst>
+                          </p:cTn>
+                        </p:par>
+                      </p:childTnLst>
+                    </p:cTn>
+                  </p:par>
+                  <p:par>
+                    <p:cTn id="7" fill="hold">
+                      <p:stCondLst>
+                        <p:cond delay="indefinite"/>
+                      </p:stCondLst>
+                      <p:childTnLst>
+                        <p:par>
+                          <p:cTn id="8" fill="hold">
+                            <p:stCondLst>
+                              <p:cond delay="0"/>
+                            </p:stCondLst>
+                            <p:childTnLst>
+                              <p:par>
+                                <p:cTn id="9" presetID="1" presetClass="entr" presetSubtype="0" fill="hold" nodeType="clickEffect">
+                                  <p:stCondLst>
+                                    <p:cond delay="0"/>
+                                  </p:stCondLst>
+                                  <p:childTnLst>
+                                    <p:set>
+                                      <p:cBhvr>
+                                        <p:cTn id="10" dur="1" fill="hold">
+                                          <p:stCondLst>
+                                            <p:cond delay="0"/>
+                                          </p:stCondLst>
+                                        </p:cTn>
+                                        <p:tgtEl>
+                                          <p:spTgt spid="3">
+                                            <p:txEl>
+                                              <p:pRg st="1" end="1"/>
+                                            </p:txEl>
+                                          </p:spTgt>
+                                        </p:tgtEl>
+                                        <p:attrNameLst>
+                                          <p:attrName>style.visibility</p:attrName>
+                                        </p:attrNameLst>
+                                      </p:cBhvr>
+                                      <p:to>
+                                        <p:strVal val="visible"/>
+                                      </p:to>
+                                    </p:set>
+                                  </p:childTnLst>
+                                </p:cTn>
+                              </p:par>
+                            </p:childTnLst>
+                          </p:cTn>
+                        </p:par>
+                      </p:childTnLst>
+                    </p:cTn>
+                  </p:par>
+                  <p:par>
+                    <p:cTn id="11" fill="hold">
+                      <p:stCondLst>
+                        <p:cond delay="indefinite"/>
+                      </p:stCondLst>
+                      <p:childTnLst>
+                        <p:par>
+                          <p:cTn id="12" fill="hold">
+                            <p:stCondLst>
+                              <p:cond delay="0"/>
+                            </p:stCondLst>
+                            <p:childTnLst>
+                              <p:par>
+                                <p:cTn id="13" presetID="1" presetClass="entr" presetSubtype="0" fill="hold" nodeType="clickEffect">
+                                  <p:stCondLst>
+                                    <p:cond delay="0"/>
+                                  </p:stCondLst>
+                                  <p:childTnLst>
+                                    <p:set>
+                                      <p:cBhvr>
+                                        <p:cTn id="14" dur="1" fill="hold">
+                                          <p:stCondLst>
+                                            <p:cond delay="0"/>
+                                          </p:stCondLst>
+                                        </p:cTn>
+                                        <p:tgtEl>
+                                          <p:spTgt spid="3">
+                                            <p:txEl>
+                                              <p:pRg st="2" end="2"/>
+                                            </p:txEl>
+                                          </p:spTgt>
+                                        </p:tgtEl>
+                                        <p:attrNameLst>
+                                          <p:attrName>style.visibility</p:attrName>
+                                        </p:attrNameLst>
+                                      </p:cBhvr>
+                                      <p:to>
+                                        <p:strVal val="visible"/>
+                                      </p:to>
+                                    </p:set>
+                                  </p:childTnLst>
+                                </p:cTn>
+                              </p:par>
+                            </p:childTnLst>
+                          </p:cTn>
+                        </p:par>
+                      </p:childTnLst>
+                    </p:cTn>
+                  </p:par>
+                  <p:par>
+                    <p:cTn id="15" fill="hold">
+                      <p:stCondLst>
+                        <p:cond delay="indefinite"/>
+                      </p:stCondLst>
+                      <p:childTnLst>
+                        <p:par>
+                          <p:cTn id="16" fill="hold">
+                            <p:stCondLst>
+                              <p:cond delay="0"/>
+                            </p:stCondLst>
+                            <p:childTnLst>
+                              <p:par>
+                                <p:cTn id="17" presetID="1" presetClass="entr" presetSubtype="0" fill="hold" nodeType="clickEffect">
+                                  <p:stCondLst>
+                                    <p:cond delay="0"/>
+                                  </p:stCondLst>
+                                  <p:childTnLst>
+                                    <p:set>
+                                      <p:cBhvr>
+                                        <p:cTn id="18" dur="1" fill="hold">
+                                          <p:stCondLst>
+                                            <p:cond delay="0"/>
+                                          </p:stCondLst>
+                                        </p:cTn>
+                                        <p:tgtEl>
+                                          <p:spTgt spid="3">
+                                            <p:txEl>
+                                              <p:pRg st="3" end="3"/>
+                                            </p:txEl>
+                                          </p:spTgt>
+                                        </p:tgtEl>
+                                        <p:attrNameLst>
+                                          <p:attrName>style.visibility</p:attrName>
+                                        </p:attrNameLst>
+                                      </p:cBhvr>
+                                      <p:to>
+                                        <p:strVal val="visible"/>
+                                      </p:to>
+                                    </p:set>
+                                  </p:childTnLst>
+                                </p:cTn>
+                              </p:par>
+                            </p:childTnLst>
+                          </p:cTn>
+                        </p:par>
+                      </p:childTnLst>
+                    </p:cTn>
+                  </p:par>
+                </p:childTnLst>
+              </p:cTn>
+              <p:prevCondLst>
+                <p:cond evt="onPrev" delay="0">
+                  <p:tgtEl>
+                    <p:sldTgt/>
+                  </p:tgtEl>
+                </p:cond>
+              </p:prevCondLst>
+              <p:nextCondLst>
+                <p:cond evt="onNext" delay="0">
+                  <p:tgtEl>
+                    <p:sldTgt/>
+                  </p:tgtEl>
+                </p:cond>
+              </p:nextCondLst>
+            </p:seq>
+          </p:childTnLst>
+        </p:cTn>
       </p:par>
     </p:tnLst>
+    <p:bldLst>
+      <p:bldP spid="3" grpId="0" uiExpand="1" build="p"/>
+    </p:bldLst>
   </p:timing>
 </p:sld>
 </file>
@@ -8450,7 +8598,7 @@
               <a:rPr lang="en-CA" dirty="0" smtClean="0">
                 <a:latin typeface="+mn-lt"/>
               </a:rPr>
-              <a:t>More Resources</a:t>
+              <a:t>Establishing Causality</a:t>
             </a:r>
             <a:endParaRPr lang="en-CA" dirty="0">
               <a:latin typeface="+mn-lt"/>
@@ -8476,36 +8624,122 @@
         </p:spPr>
         <p:txBody>
           <a:bodyPr>
-            <a:normAutofit/>
+            <a:normAutofit fontScale="92500" lnSpcReduction="10000"/>
           </a:bodyPr>
           <a:lstStyle/>
           <a:p>
             <a:r>
               <a:rPr lang="en-CA" dirty="0" smtClean="0">
-                <a:hlinkClick r:id="rId2"/>
+                <a:latin typeface="Avenir LT Std 45 Book" pitchFamily="34" charset="0"/>
               </a:rPr>
-              <a:t>http</a:t>
-            </a:r>
-            <a:r>
-              <a:rPr lang="en-CA" dirty="0">
-                <a:hlinkClick r:id="rId2"/>
+              <a:t>Observational Study: Cannot prove causation!!</a:t>
+            </a:r>
+          </a:p>
+          <a:p>
+            <a:r>
+              <a:rPr lang="en-CA" dirty="0" smtClean="0">
+                <a:latin typeface="Avenir LT Std 45 Book" pitchFamily="34" charset="0"/>
               </a:rPr>
-              <a:t>://</a:t>
-            </a:r>
+              <a:t>Randomized Control Experiment: Can sometimes prove causation, but also other potential problems:</a:t>
+            </a:r>
+          </a:p>
+          <a:p>
+            <a:pPr lvl="1"/>
             <a:r>
               <a:rPr lang="en-CA" dirty="0" smtClean="0">
-                <a:hlinkClick r:id="rId2"/>
+                <a:latin typeface="Avenir LT Std 45 Book" pitchFamily="34" charset="0"/>
               </a:rPr>
-              <a:t>data8.org/materials-sp18/lec/ch2notes.pdf</a:t>
-            </a:r>
-            <a:endParaRPr lang="en-CA" dirty="0" smtClean="0"/>
+              <a:t>Selection bias: Study’s subjects don’t represent a typical member of the population</a:t>
+            </a:r>
+          </a:p>
+          <a:p>
+            <a:pPr lvl="2"/>
+            <a:r>
+              <a:rPr lang="en-CA" dirty="0" smtClean="0">
+                <a:latin typeface="Avenir LT Std 45 Book" pitchFamily="34" charset="0"/>
+              </a:rPr>
+              <a:t>Example: Drug trial subjects are only white males</a:t>
+            </a:r>
+          </a:p>
+          <a:p>
+            <a:pPr lvl="1"/>
+            <a:r>
+              <a:rPr lang="en-CA" dirty="0" smtClean="0">
+                <a:latin typeface="Avenir LT Std 45 Book" pitchFamily="34" charset="0"/>
+              </a:rPr>
+              <a:t>Measurement error: People don’t answer truthfully</a:t>
+            </a:r>
+          </a:p>
+          <a:p>
+            <a:pPr lvl="2"/>
+            <a:r>
+              <a:rPr lang="en-CA" dirty="0" smtClean="0">
+                <a:latin typeface="Avenir LT Std 45 Book" pitchFamily="34" charset="0"/>
+              </a:rPr>
+              <a:t>Example: Farmers may underestimate crop numbers to get more aid in a government agriculture survey</a:t>
+            </a:r>
+          </a:p>
+          <a:p>
+            <a:pPr lvl="1"/>
+            <a:r>
+              <a:rPr lang="en-CA" dirty="0" smtClean="0">
+                <a:latin typeface="Avenir LT Std 45 Book" pitchFamily="34" charset="0"/>
+              </a:rPr>
+              <a:t>Questionnaire design: Leading questions, order of questions</a:t>
+            </a:r>
+          </a:p>
+          <a:p>
+            <a:pPr lvl="2"/>
+            <a:r>
+              <a:rPr lang="en-CA" dirty="0" smtClean="0">
+                <a:latin typeface="Avenir LT Std 45 Book" pitchFamily="34" charset="0"/>
+              </a:rPr>
+              <a:t>Example: “Do you agree with America’s pointless intervention in Afghanistan?”</a:t>
+            </a:r>
+          </a:p>
+          <a:p>
+            <a:pPr lvl="1"/>
+            <a:endParaRPr lang="en-CA" dirty="0">
+              <a:latin typeface="Avenir LT Std 45 Book" pitchFamily="34" charset="0"/>
+            </a:endParaRPr>
+          </a:p>
+        </p:txBody>
+      </p:sp>
+      <p:sp>
+        <p:nvSpPr>
+          <p:cNvPr id="4" name="TextBox 3"/>
+          <p:cNvSpPr txBox="1"/>
+          <p:nvPr/>
+        </p:nvSpPr>
+        <p:spPr>
+          <a:xfrm>
+            <a:off x="5543549" y="5200650"/>
+            <a:ext cx="3000375" cy="923330"/>
+          </a:xfrm>
+          <a:prstGeom prst="rect">
+            <a:avLst/>
+          </a:prstGeom>
+          <a:noFill/>
+        </p:spPr>
+        <p:txBody>
+          <a:bodyPr wrap="square" rtlCol="0">
+            <a:spAutoFit/>
+          </a:bodyPr>
+          <a:lstStyle/>
+          <a:p>
+            <a:pPr algn="r"/>
+            <a:r>
+              <a:rPr lang="en-CA" dirty="0" smtClean="0"/>
+              <a:t>Come to OH to hear more or check out Stat 152: Sampling Surveys!</a:t>
+            </a:r>
+            <a:endParaRPr lang="en-CA" dirty="0"/>
           </a:p>
         </p:txBody>
       </p:sp>
     </p:spTree>
     <p:extLst>
       <p:ext uri="{BB962C8B-B14F-4D97-AF65-F5344CB8AC3E}">
-        <p14:creationId xmlns:p14="http://schemas.microsoft.com/office/powerpoint/2010/main" val="2687181237"/>
+        <p14:creationId xmlns:p14="http://schemas.microsoft.com/office/powerpoint/2010/main" val="2912186225"/>
       </p:ext>
     </p:extLst>
   </p:cSld>
@@ -8556,14 +8790,16 @@
           </a:xfrm>
         </p:spPr>
         <p:txBody>
-          <a:bodyPr/>
+          <a:bodyPr>
+            <a:normAutofit/>
+          </a:bodyPr>
           <a:lstStyle/>
           <a:p>
             <a:r>
               <a:rPr lang="en-CA" dirty="0" smtClean="0">
                 <a:latin typeface="+mn-lt"/>
               </a:rPr>
-              <a:t>Announcements</a:t>
+              <a:t>More Resources</a:t>
             </a:r>
             <a:endParaRPr lang="en-CA" dirty="0">
               <a:latin typeface="+mn-lt"/>
@@ -8588,19 +8824,37 @@
           </a:xfrm>
         </p:spPr>
         <p:txBody>
-          <a:bodyPr/>
+          <a:bodyPr>
+            <a:normAutofit/>
+          </a:bodyPr>
           <a:lstStyle/>
           <a:p>
-            <a:endParaRPr lang="en-CA" dirty="0">
-              <a:latin typeface="Avenir LT Std 45 Book" pitchFamily="34" charset="0"/>
-            </a:endParaRPr>
+            <a:r>
+              <a:rPr lang="en-CA" dirty="0" smtClean="0">
+                <a:hlinkClick r:id="rId2"/>
+              </a:rPr>
+              <a:t>http</a:t>
+            </a:r>
+            <a:r>
+              <a:rPr lang="en-CA" dirty="0">
+                <a:hlinkClick r:id="rId2"/>
+              </a:rPr>
+              <a:t>://</a:t>
+            </a:r>
+            <a:r>
+              <a:rPr lang="en-CA" dirty="0" smtClean="0">
+                <a:hlinkClick r:id="rId2"/>
+              </a:rPr>
+              <a:t>data8.org/materials-sp18/lec/ch2notes.pdf</a:t>
+            </a:r>
+            <a:endParaRPr lang="en-CA" dirty="0" smtClean="0"/>
           </a:p>
         </p:txBody>
       </p:sp>
     </p:spTree>
     <p:extLst>
       <p:ext uri="{BB962C8B-B14F-4D97-AF65-F5344CB8AC3E}">
-        <p14:creationId xmlns:p14="http://schemas.microsoft.com/office/powerpoint/2010/main" val="203414778"/>
+        <p14:creationId xmlns:p14="http://schemas.microsoft.com/office/powerpoint/2010/main" val="2687181237"/>
       </p:ext>
     </p:extLst>
   </p:cSld>
@@ -8651,14 +8905,168 @@
           </a:xfrm>
         </p:spPr>
         <p:txBody>
-          <a:bodyPr/>
+          <a:bodyPr>
+            <a:normAutofit/>
+          </a:bodyPr>
           <a:lstStyle/>
           <a:p>
             <a:r>
               <a:rPr lang="en-CA" dirty="0" smtClean="0">
                 <a:latin typeface="+mn-lt"/>
               </a:rPr>
-              <a:t>Lab Notebook</a:t>
+              <a:t>Variables and Function Calls</a:t>
+            </a:r>
+            <a:endParaRPr lang="en-CA" dirty="0">
+              <a:latin typeface="+mn-lt"/>
+            </a:endParaRPr>
+          </a:p>
+        </p:txBody>
+      </p:sp>
+      <p:pic>
+        <p:nvPicPr>
+          <p:cNvPr id="5" name="Content Placeholder 4"/>
+          <p:cNvPicPr>
+            <a:picLocks noGrp="1" noChangeAspect="1"/>
+          </p:cNvPicPr>
+          <p:nvPr>
+            <p:ph idx="1"/>
+          </p:nvPr>
+        </p:nvPicPr>
+        <p:blipFill>
+          <a:blip r:embed="rId2">
+            <a:extLst>
+              <a:ext uri="{28A0092B-C50C-407E-A947-70E740481C1C}">
+                <a14:useLocalDpi xmlns:a14="http://schemas.microsoft.com/office/drawing/2010/main" val="0"/>
+              </a:ext>
+            </a:extLst>
+          </a:blip>
+          <a:stretch>
+            <a:fillRect/>
+          </a:stretch>
+        </p:blipFill>
+        <p:spPr>
+          <a:xfrm>
+            <a:off x="1110347" y="1600285"/>
+            <a:ext cx="6180356" cy="1440305"/>
+          </a:xfrm>
+        </p:spPr>
+      </p:pic>
+      <p:pic>
+        <p:nvPicPr>
+          <p:cNvPr id="3076" name="Picture 4"/>
+          <p:cNvPicPr>
+            <a:picLocks noChangeAspect="1" noChangeArrowheads="1"/>
+          </p:cNvPicPr>
+          <p:nvPr/>
+        </p:nvPicPr>
+        <p:blipFill rotWithShape="1">
+          <a:blip r:embed="rId3">
+            <a:extLst>
+              <a:ext uri="{28A0092B-C50C-407E-A947-70E740481C1C}">
+                <a14:useLocalDpi xmlns:a14="http://schemas.microsoft.com/office/drawing/2010/main" val="0"/>
+              </a:ext>
+            </a:extLst>
+          </a:blip>
+          <a:srcRect l="32266" t="34861" r="17813" b="28889"/>
+          <a:stretch/>
+        </p:blipFill>
+        <p:spPr bwMode="auto">
+          <a:xfrm>
+            <a:off x="2027549" y="3267075"/>
+            <a:ext cx="5088902" cy="2078566"/>
+          </a:xfrm>
+          <a:prstGeom prst="rect">
+            <a:avLst/>
+          </a:prstGeom>
+          <a:noFill/>
+          <a:ln>
+            <a:noFill/>
+          </a:ln>
+          <a:extLst>
+            <a:ext uri="{909E8E84-426E-40DD-AFC4-6F175D3DCCD1}">
+              <a14:hiddenFill xmlns:a14="http://schemas.microsoft.com/office/drawing/2010/main">
+                <a:solidFill>
+                  <a:schemeClr val="accent1"/>
+                </a:solidFill>
+              </a14:hiddenFill>
+            </a:ext>
+            <a:ext uri="{91240B29-F687-4F45-9708-019B960494DF}">
+              <a14:hiddenLine xmlns:a14="http://schemas.microsoft.com/office/drawing/2010/main" w="9525">
+                <a:solidFill>
+                  <a:schemeClr val="tx1"/>
+                </a:solidFill>
+                <a:miter lim="800000"/>
+                <a:headEnd/>
+                <a:tailEnd/>
+              </a14:hiddenLine>
+            </a:ext>
+          </a:extLst>
+        </p:spPr>
+      </p:pic>
+    </p:spTree>
+    <p:extLst>
+      <p:ext uri="{BB962C8B-B14F-4D97-AF65-F5344CB8AC3E}">
+        <p14:creationId xmlns:p14="http://schemas.microsoft.com/office/powerpoint/2010/main" val="3592108834"/>
+      </p:ext>
+    </p:extLst>
+  </p:cSld>
+  <p:clrMapOvr>
+    <a:masterClrMapping/>
+  </p:clrMapOvr>
+  <p:timing>
+    <p:tnLst>
+      <p:par>
+        <p:cTn id="1" dur="indefinite" restart="never" nodeType="tmRoot"/>
+      </p:par>
+    </p:tnLst>
+  </p:timing>
+</p:sld>
+</file>
+
+<file path=ppt/slides/slide17.xml><?xml version="1.0" encoding="utf-8"?>
+<p:sld xmlns:a="http://schemas.openxmlformats.org/drawingml/2006/main" xmlns:r="http://schemas.openxmlformats.org/officeDocument/2006/relationships" xmlns:p="http://schemas.openxmlformats.org/presentationml/2006/main">
+  <p:cSld>
+    <p:spTree>
+      <p:nvGrpSpPr>
+        <p:cNvPr id="1" name=""/>
+        <p:cNvGrpSpPr/>
+        <p:nvPr/>
+      </p:nvGrpSpPr>
+      <p:grpSpPr>
+        <a:xfrm>
+          <a:off x="0" y="0"/>
+          <a:ext cx="0" cy="0"/>
+          <a:chOff x="0" y="0"/>
+          <a:chExt cx="0" cy="0"/>
+        </a:xfrm>
+      </p:grpSpPr>
+      <p:sp>
+        <p:nvSpPr>
+          <p:cNvPr id="2" name="Title 1"/>
+          <p:cNvSpPr>
+            <a:spLocks noGrp="1"/>
+          </p:cNvSpPr>
+          <p:nvPr>
+            <p:ph type="title"/>
+          </p:nvPr>
+        </p:nvSpPr>
+        <p:spPr>
+          <a:xfrm>
+            <a:off x="457200" y="449932"/>
+            <a:ext cx="8286750" cy="1150353"/>
+          </a:xfrm>
+        </p:spPr>
+        <p:txBody>
+          <a:bodyPr>
+            <a:normAutofit/>
+          </a:bodyPr>
+          <a:lstStyle/>
+          <a:p>
+            <a:r>
+              <a:rPr lang="en-CA" dirty="0" smtClean="0">
+                <a:latin typeface="+mn-lt"/>
+              </a:rPr>
+              <a:t>Expressions: Common Functions</a:t>
             </a:r>
             <a:endParaRPr lang="en-CA" dirty="0">
               <a:latin typeface="+mn-lt"/>
@@ -8668,40 +9076,1319 @@
       </p:sp>
       <p:sp>
         <p:nvSpPr>
-          <p:cNvPr id="3" name="Content Placeholder 2"/>
+          <p:cNvPr id="4" name="AutoShape 2" descr="https://datahub.berkeley.edu/user/hubertluo/files/materials-sp19/materials/sp19/lab/lab02/statement.png"/>
+          <p:cNvSpPr>
+            <a:spLocks noChangeAspect="1" noChangeArrowheads="1"/>
+          </p:cNvSpPr>
+          <p:nvPr/>
+        </p:nvSpPr>
+        <p:spPr bwMode="auto">
+          <a:xfrm>
+            <a:off x="155575" y="-144463"/>
+            <a:ext cx="304800" cy="304801"/>
+          </a:xfrm>
+          <a:prstGeom prst="rect">
+            <a:avLst/>
+          </a:prstGeom>
+          <a:noFill/>
+          <a:extLst>
+            <a:ext uri="{909E8E84-426E-40DD-AFC4-6F175D3DCCD1}">
+              <a14:hiddenFill xmlns:a14="http://schemas.microsoft.com/office/drawing/2010/main">
+                <a:solidFill>
+                  <a:srgbClr val="FFFFFF"/>
+                </a:solidFill>
+              </a14:hiddenFill>
+            </a:ext>
+          </a:extLst>
+        </p:spPr>
+        <p:txBody>
+          <a:bodyPr vert="horz" wrap="square" lIns="91440" tIns="45720" rIns="91440" bIns="45720" numCol="1" anchor="t" anchorCtr="0" compatLnSpc="1">
+            <a:prstTxWarp prst="textNoShape">
+              <a:avLst/>
+            </a:prstTxWarp>
+          </a:bodyPr>
+          <a:lstStyle/>
+          <a:p>
+            <a:endParaRPr lang="en-CA"/>
+          </a:p>
+        </p:txBody>
+      </p:sp>
+      <p:graphicFrame>
+        <p:nvGraphicFramePr>
+          <p:cNvPr id="7" name="Content Placeholder 6"/>
+          <p:cNvGraphicFramePr>
+            <a:graphicFrameLocks noGrp="1"/>
+          </p:cNvGraphicFramePr>
+          <p:nvPr>
+            <p:ph idx="1"/>
+            <p:extLst>
+              <p:ext uri="{D42A27DB-BD31-4B8C-83A1-F6EECF244321}">
+                <p14:modId xmlns:p14="http://schemas.microsoft.com/office/powerpoint/2010/main" val="549641626"/>
+              </p:ext>
+            </p:extLst>
+          </p:nvPr>
+        </p:nvGraphicFramePr>
+        <p:xfrm>
+          <a:off x="615950" y="1624098"/>
+          <a:ext cx="7740652" cy="2595880"/>
+        </p:xfrm>
+        <a:graphic>
+          <a:graphicData uri="http://schemas.openxmlformats.org/drawingml/2006/table">
+            <a:tbl>
+              <a:tblPr firstRow="1" bandRow="1">
+                <a:tableStyleId>{5C22544A-7EE6-4342-B048-85BDC9FD1C3A}</a:tableStyleId>
+              </a:tblPr>
+              <a:tblGrid>
+                <a:gridCol w="2622550"/>
+                <a:gridCol w="1247776"/>
+                <a:gridCol w="1935163"/>
+                <a:gridCol w="1935163"/>
+              </a:tblGrid>
+              <a:tr h="370840">
+                <a:tc>
+                  <a:txBody>
+                    <a:bodyPr/>
+                    <a:lstStyle/>
+                    <a:p>
+                      <a:pPr algn="ctr"/>
+                      <a:r>
+                        <a:rPr lang="en-CA" dirty="0" smtClean="0">
+                          <a:effectLst/>
+                        </a:rPr>
+                        <a:t>Expression </a:t>
+                      </a:r>
+                      <a:r>
+                        <a:rPr lang="en-CA" dirty="0">
+                          <a:effectLst/>
+                        </a:rPr>
+                        <a:t>Type</a:t>
+                      </a:r>
+                    </a:p>
+                  </a:txBody>
+                  <a:tcPr anchor="ctr"/>
+                </a:tc>
+                <a:tc>
+                  <a:txBody>
+                    <a:bodyPr/>
+                    <a:lstStyle/>
+                    <a:p>
+                      <a:pPr algn="ctr"/>
+                      <a:r>
+                        <a:rPr lang="en-CA">
+                          <a:effectLst/>
+                        </a:rPr>
+                        <a:t>Operator</a:t>
+                      </a:r>
+                    </a:p>
+                  </a:txBody>
+                  <a:tcPr anchor="ctr"/>
+                </a:tc>
+                <a:tc>
+                  <a:txBody>
+                    <a:bodyPr/>
+                    <a:lstStyle/>
+                    <a:p>
+                      <a:pPr algn="ctr"/>
+                      <a:r>
+                        <a:rPr lang="en-CA" dirty="0">
+                          <a:effectLst/>
+                        </a:rPr>
+                        <a:t>Example</a:t>
+                      </a:r>
+                    </a:p>
+                  </a:txBody>
+                  <a:tcPr anchor="ctr"/>
+                </a:tc>
+                <a:tc>
+                  <a:txBody>
+                    <a:bodyPr/>
+                    <a:lstStyle/>
+                    <a:p>
+                      <a:pPr algn="ctr"/>
+                      <a:r>
+                        <a:rPr lang="en-CA">
+                          <a:effectLst/>
+                        </a:rPr>
+                        <a:t>Value</a:t>
+                      </a:r>
+                    </a:p>
+                  </a:txBody>
+                  <a:tcPr anchor="ctr"/>
+                </a:tc>
+              </a:tr>
+              <a:tr h="370840">
+                <a:tc>
+                  <a:txBody>
+                    <a:bodyPr/>
+                    <a:lstStyle/>
+                    <a:p>
+                      <a:pPr algn="ctr"/>
+                      <a:r>
+                        <a:rPr lang="en-CA">
+                          <a:effectLst/>
+                        </a:rPr>
+                        <a:t>Addition</a:t>
+                      </a:r>
+                    </a:p>
+                  </a:txBody>
+                  <a:tcPr anchor="ctr"/>
+                </a:tc>
+                <a:tc>
+                  <a:txBody>
+                    <a:bodyPr/>
+                    <a:lstStyle/>
+                    <a:p>
+                      <a:pPr algn="ctr"/>
+                      <a:r>
+                        <a:rPr lang="en-CA">
+                          <a:effectLst/>
+                        </a:rPr>
+                        <a:t>+</a:t>
+                      </a:r>
+                    </a:p>
+                  </a:txBody>
+                  <a:tcPr anchor="ctr"/>
+                </a:tc>
+                <a:tc>
+                  <a:txBody>
+                    <a:bodyPr/>
+                    <a:lstStyle/>
+                    <a:p>
+                      <a:pPr algn="ctr"/>
+                      <a:r>
+                        <a:rPr lang="en-CA">
+                          <a:effectLst/>
+                        </a:rPr>
+                        <a:t>2 + 3</a:t>
+                      </a:r>
+                    </a:p>
+                  </a:txBody>
+                  <a:tcPr anchor="ctr"/>
+                </a:tc>
+                <a:tc>
+                  <a:txBody>
+                    <a:bodyPr/>
+                    <a:lstStyle/>
+                    <a:p>
+                      <a:pPr algn="ctr"/>
+                      <a:r>
+                        <a:rPr lang="en-CA">
+                          <a:effectLst/>
+                        </a:rPr>
+                        <a:t>5</a:t>
+                      </a:r>
+                    </a:p>
+                  </a:txBody>
+                  <a:tcPr anchor="ctr"/>
+                </a:tc>
+              </a:tr>
+              <a:tr h="370840">
+                <a:tc>
+                  <a:txBody>
+                    <a:bodyPr/>
+                    <a:lstStyle/>
+                    <a:p>
+                      <a:pPr algn="ctr"/>
+                      <a:r>
+                        <a:rPr lang="en-CA">
+                          <a:effectLst/>
+                        </a:rPr>
+                        <a:t>Subtraction</a:t>
+                      </a:r>
+                    </a:p>
+                  </a:txBody>
+                  <a:tcPr anchor="ctr"/>
+                </a:tc>
+                <a:tc>
+                  <a:txBody>
+                    <a:bodyPr/>
+                    <a:lstStyle/>
+                    <a:p>
+                      <a:pPr algn="ctr"/>
+                      <a:r>
+                        <a:rPr lang="en-CA">
+                          <a:effectLst/>
+                        </a:rPr>
+                        <a:t>-</a:t>
+                      </a:r>
+                    </a:p>
+                  </a:txBody>
+                  <a:tcPr anchor="ctr"/>
+                </a:tc>
+                <a:tc>
+                  <a:txBody>
+                    <a:bodyPr/>
+                    <a:lstStyle/>
+                    <a:p>
+                      <a:pPr algn="ctr"/>
+                      <a:r>
+                        <a:rPr lang="en-CA">
+                          <a:effectLst/>
+                        </a:rPr>
+                        <a:t>2 - 3</a:t>
+                      </a:r>
+                    </a:p>
+                  </a:txBody>
+                  <a:tcPr anchor="ctr"/>
+                </a:tc>
+                <a:tc>
+                  <a:txBody>
+                    <a:bodyPr/>
+                    <a:lstStyle/>
+                    <a:p>
+                      <a:pPr algn="ctr"/>
+                      <a:r>
+                        <a:rPr lang="en-CA">
+                          <a:effectLst/>
+                        </a:rPr>
+                        <a:t>-1</a:t>
+                      </a:r>
+                    </a:p>
+                  </a:txBody>
+                  <a:tcPr anchor="ctr"/>
+                </a:tc>
+              </a:tr>
+              <a:tr h="370840">
+                <a:tc>
+                  <a:txBody>
+                    <a:bodyPr/>
+                    <a:lstStyle/>
+                    <a:p>
+                      <a:pPr algn="ctr"/>
+                      <a:r>
+                        <a:rPr lang="en-CA">
+                          <a:effectLst/>
+                        </a:rPr>
+                        <a:t>Multiplication</a:t>
+                      </a:r>
+                    </a:p>
+                  </a:txBody>
+                  <a:tcPr anchor="ctr"/>
+                </a:tc>
+                <a:tc>
+                  <a:txBody>
+                    <a:bodyPr/>
+                    <a:lstStyle/>
+                    <a:p>
+                      <a:pPr algn="ctr"/>
+                      <a:r>
+                        <a:rPr lang="en-CA">
+                          <a:effectLst/>
+                        </a:rPr>
+                        <a:t>*</a:t>
+                      </a:r>
+                    </a:p>
+                  </a:txBody>
+                  <a:tcPr anchor="ctr"/>
+                </a:tc>
+                <a:tc>
+                  <a:txBody>
+                    <a:bodyPr/>
+                    <a:lstStyle/>
+                    <a:p>
+                      <a:pPr algn="ctr"/>
+                      <a:r>
+                        <a:rPr lang="en-CA">
+                          <a:effectLst/>
+                        </a:rPr>
+                        <a:t>2 * 3</a:t>
+                      </a:r>
+                    </a:p>
+                  </a:txBody>
+                  <a:tcPr anchor="ctr"/>
+                </a:tc>
+                <a:tc>
+                  <a:txBody>
+                    <a:bodyPr/>
+                    <a:lstStyle/>
+                    <a:p>
+                      <a:pPr algn="ctr"/>
+                      <a:r>
+                        <a:rPr lang="en-CA">
+                          <a:effectLst/>
+                        </a:rPr>
+                        <a:t>6</a:t>
+                      </a:r>
+                    </a:p>
+                  </a:txBody>
+                  <a:tcPr anchor="ctr"/>
+                </a:tc>
+              </a:tr>
+              <a:tr h="370840">
+                <a:tc>
+                  <a:txBody>
+                    <a:bodyPr/>
+                    <a:lstStyle/>
+                    <a:p>
+                      <a:pPr algn="ctr"/>
+                      <a:r>
+                        <a:rPr lang="en-CA">
+                          <a:effectLst/>
+                        </a:rPr>
+                        <a:t>Division</a:t>
+                      </a:r>
+                    </a:p>
+                  </a:txBody>
+                  <a:tcPr anchor="ctr"/>
+                </a:tc>
+                <a:tc>
+                  <a:txBody>
+                    <a:bodyPr/>
+                    <a:lstStyle/>
+                    <a:p>
+                      <a:pPr algn="ctr"/>
+                      <a:r>
+                        <a:rPr lang="en-CA">
+                          <a:effectLst/>
+                        </a:rPr>
+                        <a:t>/</a:t>
+                      </a:r>
+                    </a:p>
+                  </a:txBody>
+                  <a:tcPr anchor="ctr"/>
+                </a:tc>
+                <a:tc>
+                  <a:txBody>
+                    <a:bodyPr/>
+                    <a:lstStyle/>
+                    <a:p>
+                      <a:pPr algn="ctr"/>
+                      <a:r>
+                        <a:rPr lang="en-CA">
+                          <a:effectLst/>
+                        </a:rPr>
+                        <a:t>7 / 3</a:t>
+                      </a:r>
+                    </a:p>
+                  </a:txBody>
+                  <a:tcPr anchor="ctr"/>
+                </a:tc>
+                <a:tc>
+                  <a:txBody>
+                    <a:bodyPr/>
+                    <a:lstStyle/>
+                    <a:p>
+                      <a:pPr algn="ctr"/>
+                      <a:r>
+                        <a:rPr lang="en-CA">
+                          <a:effectLst/>
+                        </a:rPr>
+                        <a:t>2.66667</a:t>
+                      </a:r>
+                    </a:p>
+                  </a:txBody>
+                  <a:tcPr anchor="ctr"/>
+                </a:tc>
+              </a:tr>
+              <a:tr h="370840">
+                <a:tc>
+                  <a:txBody>
+                    <a:bodyPr/>
+                    <a:lstStyle/>
+                    <a:p>
+                      <a:pPr algn="ctr"/>
+                      <a:r>
+                        <a:rPr lang="en-CA">
+                          <a:effectLst/>
+                        </a:rPr>
+                        <a:t>Remainder</a:t>
+                      </a:r>
+                    </a:p>
+                  </a:txBody>
+                  <a:tcPr anchor="ctr"/>
+                </a:tc>
+                <a:tc>
+                  <a:txBody>
+                    <a:bodyPr/>
+                    <a:lstStyle/>
+                    <a:p>
+                      <a:pPr algn="ctr"/>
+                      <a:r>
+                        <a:rPr lang="en-CA">
+                          <a:effectLst/>
+                        </a:rPr>
+                        <a:t>%</a:t>
+                      </a:r>
+                    </a:p>
+                  </a:txBody>
+                  <a:tcPr anchor="ctr"/>
+                </a:tc>
+                <a:tc>
+                  <a:txBody>
+                    <a:bodyPr/>
+                    <a:lstStyle/>
+                    <a:p>
+                      <a:pPr algn="ctr"/>
+                      <a:r>
+                        <a:rPr lang="en-CA">
+                          <a:effectLst/>
+                        </a:rPr>
+                        <a:t>7 % 3</a:t>
+                      </a:r>
+                    </a:p>
+                  </a:txBody>
+                  <a:tcPr anchor="ctr"/>
+                </a:tc>
+                <a:tc>
+                  <a:txBody>
+                    <a:bodyPr/>
+                    <a:lstStyle/>
+                    <a:p>
+                      <a:pPr algn="ctr"/>
+                      <a:r>
+                        <a:rPr lang="en-CA">
+                          <a:effectLst/>
+                        </a:rPr>
+                        <a:t>1</a:t>
+                      </a:r>
+                    </a:p>
+                  </a:txBody>
+                  <a:tcPr anchor="ctr"/>
+                </a:tc>
+              </a:tr>
+              <a:tr h="370840">
+                <a:tc>
+                  <a:txBody>
+                    <a:bodyPr/>
+                    <a:lstStyle/>
+                    <a:p>
+                      <a:pPr algn="ctr"/>
+                      <a:r>
+                        <a:rPr lang="en-CA" dirty="0">
+                          <a:effectLst/>
+                        </a:rPr>
+                        <a:t>Exponentiation</a:t>
+                      </a:r>
+                    </a:p>
+                  </a:txBody>
+                  <a:tcPr anchor="ctr"/>
+                </a:tc>
+                <a:tc>
+                  <a:txBody>
+                    <a:bodyPr/>
+                    <a:lstStyle/>
+                    <a:p>
+                      <a:pPr algn="ctr"/>
+                      <a:r>
+                        <a:rPr lang="en-CA">
+                          <a:effectLst/>
+                        </a:rPr>
+                        <a:t>**</a:t>
+                      </a:r>
+                    </a:p>
+                  </a:txBody>
+                  <a:tcPr anchor="ctr"/>
+                </a:tc>
+                <a:tc>
+                  <a:txBody>
+                    <a:bodyPr/>
+                    <a:lstStyle/>
+                    <a:p>
+                      <a:pPr algn="ctr"/>
+                      <a:r>
+                        <a:rPr lang="en-CA">
+                          <a:effectLst/>
+                        </a:rPr>
+                        <a:t>2 ** 0.5</a:t>
+                      </a:r>
+                    </a:p>
+                  </a:txBody>
+                  <a:tcPr anchor="ctr"/>
+                </a:tc>
+                <a:tc>
+                  <a:txBody>
+                    <a:bodyPr/>
+                    <a:lstStyle/>
+                    <a:p>
+                      <a:pPr algn="ctr"/>
+                      <a:r>
+                        <a:rPr lang="en-CA" dirty="0">
+                          <a:effectLst/>
+                        </a:rPr>
+                        <a:t>1.41421</a:t>
+                      </a:r>
+                    </a:p>
+                  </a:txBody>
+                  <a:tcPr anchor="ctr"/>
+                </a:tc>
+              </a:tr>
+            </a:tbl>
+          </a:graphicData>
+        </a:graphic>
+      </p:graphicFrame>
+    </p:spTree>
+    <p:extLst>
+      <p:ext uri="{BB962C8B-B14F-4D97-AF65-F5344CB8AC3E}">
+        <p14:creationId xmlns:p14="http://schemas.microsoft.com/office/powerpoint/2010/main" val="2474459831"/>
+      </p:ext>
+    </p:extLst>
+  </p:cSld>
+  <p:clrMapOvr>
+    <a:masterClrMapping/>
+  </p:clrMapOvr>
+  <p:timing>
+    <p:tnLst>
+      <p:par>
+        <p:cTn id="1" dur="indefinite" restart="never" nodeType="tmRoot"/>
+      </p:par>
+    </p:tnLst>
+  </p:timing>
+</p:sld>
+</file>
+
+<file path=ppt/slides/slide18.xml><?xml version="1.0" encoding="utf-8"?>
+<p:sld xmlns:a="http://schemas.openxmlformats.org/drawingml/2006/main" xmlns:r="http://schemas.openxmlformats.org/officeDocument/2006/relationships" xmlns:p="http://schemas.openxmlformats.org/presentationml/2006/main">
+  <p:cSld>
+    <p:spTree>
+      <p:nvGrpSpPr>
+        <p:cNvPr id="1" name=""/>
+        <p:cNvGrpSpPr/>
+        <p:nvPr/>
+      </p:nvGrpSpPr>
+      <p:grpSpPr>
+        <a:xfrm>
+          <a:off x="0" y="0"/>
+          <a:ext cx="0" cy="0"/>
+          <a:chOff x="0" y="0"/>
+          <a:chExt cx="0" cy="0"/>
+        </a:xfrm>
+      </p:grpSpPr>
+      <p:sp>
+        <p:nvSpPr>
+          <p:cNvPr id="2" name="Title 1"/>
           <p:cNvSpPr>
             <a:spLocks noGrp="1"/>
           </p:cNvSpPr>
           <p:nvPr>
-            <p:ph idx="1"/>
+            <p:ph type="title"/>
           </p:nvPr>
         </p:nvSpPr>
         <p:spPr>
           <a:xfrm>
-            <a:off x="457200" y="1756947"/>
-            <a:ext cx="8286750" cy="3596103"/>
+            <a:off x="457200" y="449932"/>
+            <a:ext cx="8286750" cy="1150353"/>
           </a:xfrm>
         </p:spPr>
         <p:txBody>
-          <a:bodyPr/>
+          <a:bodyPr>
+            <a:normAutofit/>
+          </a:bodyPr>
           <a:lstStyle/>
           <a:p>
-            <a:pPr marL="0" indent="0">
-              <a:buNone/>
-            </a:pPr>
-            <a:r>
-              <a:rPr lang="en-CA" smtClean="0">
-                <a:latin typeface="Avenir LT Std 45 Book" pitchFamily="34" charset="0"/>
+            <a:r>
+              <a:rPr lang="en-CA" dirty="0" smtClean="0">
+                <a:latin typeface="+mn-lt"/>
               </a:rPr>
-              <a:t>TBD</a:t>
-            </a:r>
+              <a:t>Expressions: Common Functions</a:t>
+            </a:r>
+            <a:endParaRPr lang="en-CA" dirty="0">
+              <a:latin typeface="+mn-lt"/>
+            </a:endParaRPr>
+          </a:p>
+        </p:txBody>
+      </p:sp>
+      <p:graphicFrame>
+        <p:nvGraphicFramePr>
+          <p:cNvPr id="5" name="Content Placeholder 4"/>
+          <p:cNvGraphicFramePr>
+            <a:graphicFrameLocks noGrp="1"/>
+          </p:cNvGraphicFramePr>
+          <p:nvPr>
+            <p:ph idx="1"/>
+            <p:extLst>
+              <p:ext uri="{D42A27DB-BD31-4B8C-83A1-F6EECF244321}">
+                <p14:modId xmlns:p14="http://schemas.microsoft.com/office/powerpoint/2010/main" val="3150511278"/>
+              </p:ext>
+            </p:extLst>
+          </p:nvPr>
+        </p:nvGraphicFramePr>
+        <p:xfrm>
+          <a:off x="590550" y="1624098"/>
+          <a:ext cx="8286750" cy="3571240"/>
+        </p:xfrm>
+        <a:graphic>
+          <a:graphicData uri="http://schemas.openxmlformats.org/drawingml/2006/table">
+            <a:tbl>
+              <a:tblPr firstRow="1" bandRow="1">
+                <a:tableStyleId>{5C22544A-7EE6-4342-B048-85BDC9FD1C3A}</a:tableStyleId>
+              </a:tblPr>
+              <a:tblGrid>
+                <a:gridCol w="1419225"/>
+                <a:gridCol w="4086225"/>
+                <a:gridCol w="2781300"/>
+              </a:tblGrid>
+              <a:tr h="370840">
+                <a:tc>
+                  <a:txBody>
+                    <a:bodyPr/>
+                    <a:lstStyle/>
+                    <a:p>
+                      <a:pPr algn="ctr"/>
+                      <a:r>
+                        <a:rPr lang="en-CA" dirty="0" smtClean="0"/>
+                        <a:t>Function</a:t>
+                      </a:r>
+                      <a:endParaRPr lang="en-CA" dirty="0"/>
+                    </a:p>
+                  </a:txBody>
+                  <a:tcPr/>
+                </a:tc>
+                <a:tc>
+                  <a:txBody>
+                    <a:bodyPr/>
+                    <a:lstStyle/>
+                    <a:p>
+                      <a:pPr algn="ctr"/>
+                      <a:r>
+                        <a:rPr lang="en-CA" dirty="0" smtClean="0"/>
+                        <a:t>Description</a:t>
+                      </a:r>
+                      <a:endParaRPr lang="en-CA" dirty="0"/>
+                    </a:p>
+                  </a:txBody>
+                  <a:tcPr/>
+                </a:tc>
+                <a:tc>
+                  <a:txBody>
+                    <a:bodyPr/>
+                    <a:lstStyle/>
+                    <a:p>
+                      <a:pPr algn="ctr"/>
+                      <a:r>
+                        <a:rPr lang="en-CA" dirty="0" smtClean="0"/>
+                        <a:t>Example</a:t>
+                      </a:r>
+                      <a:endParaRPr lang="en-CA" dirty="0"/>
+                    </a:p>
+                  </a:txBody>
+                  <a:tcPr/>
+                </a:tc>
+              </a:tr>
+              <a:tr h="370840">
+                <a:tc>
+                  <a:txBody>
+                    <a:bodyPr/>
+                    <a:lstStyle/>
+                    <a:p>
+                      <a:pPr algn="ctr" fontAlgn="ctr"/>
+                      <a:r>
+                        <a:rPr lang="en-CA" dirty="0">
+                          <a:effectLst/>
+                        </a:rPr>
+                        <a:t>abs</a:t>
+                      </a:r>
+                    </a:p>
+                  </a:txBody>
+                  <a:tcPr anchor="ctr"/>
+                </a:tc>
+                <a:tc>
+                  <a:txBody>
+                    <a:bodyPr/>
+                    <a:lstStyle/>
+                    <a:p>
+                      <a:pPr algn="ctr" fontAlgn="ctr"/>
+                      <a:r>
+                        <a:rPr lang="en-CA" dirty="0">
+                          <a:effectLst/>
+                        </a:rPr>
+                        <a:t>Returns the absolute value of its </a:t>
+                      </a:r>
+                      <a:r>
+                        <a:rPr lang="en-CA" dirty="0" smtClean="0">
+                          <a:effectLst/>
+                        </a:rPr>
+                        <a:t>argument</a:t>
+                      </a:r>
+                    </a:p>
+                  </a:txBody>
+                  <a:tcPr anchor="ctr"/>
+                </a:tc>
+                <a:tc>
+                  <a:txBody>
+                    <a:bodyPr/>
+                    <a:lstStyle/>
+                    <a:p>
+                      <a:pPr algn="ctr" fontAlgn="ctr"/>
+                      <a:r>
+                        <a:rPr lang="en-CA" dirty="0" smtClean="0">
+                          <a:effectLst/>
+                        </a:rPr>
+                        <a:t>abs(-3)</a:t>
+                      </a:r>
+                      <a:r>
+                        <a:rPr lang="en-CA" baseline="0" dirty="0" smtClean="0">
+                          <a:effectLst/>
+                        </a:rPr>
+                        <a:t> -&gt; 3</a:t>
+                      </a:r>
+                      <a:endParaRPr lang="en-CA" dirty="0" smtClean="0">
+                        <a:effectLst/>
+                      </a:endParaRPr>
+                    </a:p>
+                  </a:txBody>
+                  <a:tcPr anchor="ctr"/>
+                </a:tc>
+              </a:tr>
+              <a:tr h="370840">
+                <a:tc>
+                  <a:txBody>
+                    <a:bodyPr/>
+                    <a:lstStyle/>
+                    <a:p>
+                      <a:pPr algn="ctr" fontAlgn="ctr"/>
+                      <a:r>
+                        <a:rPr lang="en-CA">
+                          <a:effectLst/>
+                        </a:rPr>
+                        <a:t>max</a:t>
+                      </a:r>
+                    </a:p>
+                  </a:txBody>
+                  <a:tcPr anchor="ctr"/>
+                </a:tc>
+                <a:tc>
+                  <a:txBody>
+                    <a:bodyPr/>
+                    <a:lstStyle/>
+                    <a:p>
+                      <a:pPr algn="ctr" fontAlgn="ctr"/>
+                      <a:r>
+                        <a:rPr lang="en-CA">
+                          <a:effectLst/>
+                        </a:rPr>
+                        <a:t>Returns the maximum of all its arguments</a:t>
+                      </a:r>
+                    </a:p>
+                  </a:txBody>
+                  <a:tcPr anchor="ctr"/>
+                </a:tc>
+                <a:tc>
+                  <a:txBody>
+                    <a:bodyPr/>
+                    <a:lstStyle/>
+                    <a:p>
+                      <a:pPr algn="ctr" fontAlgn="ctr"/>
+                      <a:r>
+                        <a:rPr lang="en-CA" dirty="0" smtClean="0">
+                          <a:effectLst/>
+                        </a:rPr>
+                        <a:t>max(1,2) -&gt; 2</a:t>
+                      </a:r>
+                      <a:endParaRPr lang="en-CA" dirty="0">
+                        <a:effectLst/>
+                      </a:endParaRPr>
+                    </a:p>
+                  </a:txBody>
+                  <a:tcPr anchor="ctr"/>
+                </a:tc>
+              </a:tr>
+              <a:tr h="370840">
+                <a:tc>
+                  <a:txBody>
+                    <a:bodyPr/>
+                    <a:lstStyle/>
+                    <a:p>
+                      <a:pPr algn="ctr" fontAlgn="ctr"/>
+                      <a:r>
+                        <a:rPr lang="en-CA">
+                          <a:effectLst/>
+                        </a:rPr>
+                        <a:t>min</a:t>
+                      </a:r>
+                    </a:p>
+                  </a:txBody>
+                  <a:tcPr anchor="ctr"/>
+                </a:tc>
+                <a:tc>
+                  <a:txBody>
+                    <a:bodyPr/>
+                    <a:lstStyle/>
+                    <a:p>
+                      <a:pPr algn="ctr" fontAlgn="ctr"/>
+                      <a:r>
+                        <a:rPr lang="en-CA">
+                          <a:effectLst/>
+                        </a:rPr>
+                        <a:t>Returns the minimum of all its arguments</a:t>
+                      </a:r>
+                    </a:p>
+                  </a:txBody>
+                  <a:tcPr anchor="ctr"/>
+                </a:tc>
+                <a:tc>
+                  <a:txBody>
+                    <a:bodyPr/>
+                    <a:lstStyle/>
+                    <a:p>
+                      <a:pPr algn="ctr" fontAlgn="ctr"/>
+                      <a:r>
+                        <a:rPr lang="en-CA" dirty="0" smtClean="0">
+                          <a:effectLst/>
+                        </a:rPr>
+                        <a:t>min(1,3)</a:t>
+                      </a:r>
+                      <a:r>
+                        <a:rPr lang="en-CA" baseline="0" dirty="0" smtClean="0">
+                          <a:effectLst/>
+                        </a:rPr>
+                        <a:t> -&gt; 1</a:t>
+                      </a:r>
+                      <a:endParaRPr lang="en-CA" dirty="0">
+                        <a:effectLst/>
+                      </a:endParaRPr>
+                    </a:p>
+                  </a:txBody>
+                  <a:tcPr anchor="ctr"/>
+                </a:tc>
+              </a:tr>
+              <a:tr h="370840">
+                <a:tc>
+                  <a:txBody>
+                    <a:bodyPr/>
+                    <a:lstStyle/>
+                    <a:p>
+                      <a:pPr algn="ctr" fontAlgn="ctr"/>
+                      <a:r>
+                        <a:rPr lang="en-CA">
+                          <a:effectLst/>
+                        </a:rPr>
+                        <a:t>pow</a:t>
+                      </a:r>
+                    </a:p>
+                  </a:txBody>
+                  <a:tcPr anchor="ctr"/>
+                </a:tc>
+                <a:tc>
+                  <a:txBody>
+                    <a:bodyPr/>
+                    <a:lstStyle/>
+                    <a:p>
+                      <a:pPr algn="ctr" fontAlgn="ctr"/>
+                      <a:r>
+                        <a:rPr lang="en-CA">
+                          <a:effectLst/>
+                        </a:rPr>
+                        <a:t>Raises its first argument to the power of its second argument</a:t>
+                      </a:r>
+                    </a:p>
+                  </a:txBody>
+                  <a:tcPr anchor="ctr"/>
+                </a:tc>
+                <a:tc>
+                  <a:txBody>
+                    <a:bodyPr/>
+                    <a:lstStyle/>
+                    <a:p>
+                      <a:pPr algn="ctr" fontAlgn="ctr"/>
+                      <a:r>
+                        <a:rPr lang="en-CA" dirty="0" smtClean="0">
+                          <a:effectLst/>
+                        </a:rPr>
+                        <a:t>pow(2,0) -&gt; 1</a:t>
+                      </a:r>
+                      <a:endParaRPr lang="en-CA" dirty="0">
+                        <a:effectLst/>
+                      </a:endParaRPr>
+                    </a:p>
+                  </a:txBody>
+                  <a:tcPr anchor="ctr"/>
+                </a:tc>
+              </a:tr>
+              <a:tr h="370840">
+                <a:tc>
+                  <a:txBody>
+                    <a:bodyPr/>
+                    <a:lstStyle/>
+                    <a:p>
+                      <a:pPr algn="ctr" fontAlgn="ctr"/>
+                      <a:r>
+                        <a:rPr lang="en-CA">
+                          <a:effectLst/>
+                        </a:rPr>
+                        <a:t>round</a:t>
+                      </a:r>
+                    </a:p>
+                  </a:txBody>
+                  <a:tcPr anchor="ctr"/>
+                </a:tc>
+                <a:tc>
+                  <a:txBody>
+                    <a:bodyPr/>
+                    <a:lstStyle/>
+                    <a:p>
+                      <a:pPr algn="ctr" fontAlgn="ctr"/>
+                      <a:r>
+                        <a:rPr lang="en-CA" dirty="0">
+                          <a:effectLst/>
+                        </a:rPr>
+                        <a:t>Rounds its argument to the nearest integer</a:t>
+                      </a:r>
+                    </a:p>
+                  </a:txBody>
+                  <a:tcPr anchor="ctr"/>
+                </a:tc>
+                <a:tc>
+                  <a:txBody>
+                    <a:bodyPr/>
+                    <a:lstStyle/>
+                    <a:p>
+                      <a:pPr algn="ctr" fontAlgn="ctr"/>
+                      <a:r>
+                        <a:rPr lang="en-CA" dirty="0" smtClean="0">
+                          <a:effectLst/>
+                        </a:rPr>
+                        <a:t>round(0.6) -&gt; 1</a:t>
+                      </a:r>
+                      <a:endParaRPr lang="en-CA" dirty="0">
+                        <a:effectLst/>
+                      </a:endParaRPr>
+                    </a:p>
+                  </a:txBody>
+                  <a:tcPr anchor="ctr"/>
+                </a:tc>
+              </a:tr>
+            </a:tbl>
+          </a:graphicData>
+        </a:graphic>
+      </p:graphicFrame>
+      <p:sp>
+        <p:nvSpPr>
+          <p:cNvPr id="4" name="AutoShape 2" descr="https://datahub.berkeley.edu/user/hubertluo/files/materials-sp19/materials/sp19/lab/lab02/statement.png"/>
+          <p:cNvSpPr>
+            <a:spLocks noChangeAspect="1" noChangeArrowheads="1"/>
+          </p:cNvSpPr>
+          <p:nvPr/>
+        </p:nvSpPr>
+        <p:spPr bwMode="auto">
+          <a:xfrm>
+            <a:off x="155575" y="-144463"/>
+            <a:ext cx="304800" cy="304801"/>
+          </a:xfrm>
+          <a:prstGeom prst="rect">
+            <a:avLst/>
+          </a:prstGeom>
+          <a:noFill/>
+          <a:extLst>
+            <a:ext uri="{909E8E84-426E-40DD-AFC4-6F175D3DCCD1}">
+              <a14:hiddenFill xmlns:a14="http://schemas.microsoft.com/office/drawing/2010/main">
+                <a:solidFill>
+                  <a:srgbClr val="FFFFFF"/>
+                </a:solidFill>
+              </a14:hiddenFill>
+            </a:ext>
+          </a:extLst>
+        </p:spPr>
+        <p:txBody>
+          <a:bodyPr vert="horz" wrap="square" lIns="91440" tIns="45720" rIns="91440" bIns="45720" numCol="1" anchor="t" anchorCtr="0" compatLnSpc="1">
+            <a:prstTxWarp prst="textNoShape">
+              <a:avLst/>
+            </a:prstTxWarp>
+          </a:bodyPr>
+          <a:lstStyle/>
+          <a:p>
+            <a:endParaRPr lang="en-CA"/>
           </a:p>
         </p:txBody>
       </p:sp>
     </p:spTree>
     <p:extLst>
       <p:ext uri="{BB962C8B-B14F-4D97-AF65-F5344CB8AC3E}">
-        <p14:creationId xmlns:p14="http://schemas.microsoft.com/office/powerpoint/2010/main" val="687167673"/>
+        <p14:creationId xmlns:p14="http://schemas.microsoft.com/office/powerpoint/2010/main" val="148280054"/>
+      </p:ext>
+    </p:extLst>
+  </p:cSld>
+  <p:clrMapOvr>
+    <a:masterClrMapping/>
+  </p:clrMapOvr>
+  <p:timing>
+    <p:tnLst>
+      <p:par>
+        <p:cTn id="1" dur="indefinite" restart="never" nodeType="tmRoot"/>
+      </p:par>
+    </p:tnLst>
+  </p:timing>
+</p:sld>
+</file>
+
+<file path=ppt/slides/slide19.xml><?xml version="1.0" encoding="utf-8"?>
+<p:sld xmlns:a="http://schemas.openxmlformats.org/drawingml/2006/main" xmlns:r="http://schemas.openxmlformats.org/officeDocument/2006/relationships" xmlns:p="http://schemas.openxmlformats.org/presentationml/2006/main">
+  <p:cSld>
+    <p:spTree>
+      <p:nvGrpSpPr>
+        <p:cNvPr id="1" name=""/>
+        <p:cNvGrpSpPr/>
+        <p:nvPr/>
+      </p:nvGrpSpPr>
+      <p:grpSpPr>
+        <a:xfrm>
+          <a:off x="0" y="0"/>
+          <a:ext cx="0" cy="0"/>
+          <a:chOff x="0" y="0"/>
+          <a:chExt cx="0" cy="0"/>
+        </a:xfrm>
+      </p:grpSpPr>
+      <p:sp>
+        <p:nvSpPr>
+          <p:cNvPr id="2" name="Title 1"/>
+          <p:cNvSpPr>
+            <a:spLocks noGrp="1"/>
+          </p:cNvSpPr>
+          <p:nvPr>
+            <p:ph type="title"/>
+          </p:nvPr>
+        </p:nvSpPr>
+        <p:spPr>
+          <a:xfrm>
+            <a:off x="457200" y="449932"/>
+            <a:ext cx="8286750" cy="1150353"/>
+          </a:xfrm>
+        </p:spPr>
+        <p:txBody>
+          <a:bodyPr>
+            <a:normAutofit/>
+          </a:bodyPr>
+          <a:lstStyle/>
+          <a:p>
+            <a:r>
+              <a:rPr lang="en-CA" dirty="0" smtClean="0">
+                <a:latin typeface="+mn-lt"/>
+              </a:rPr>
+              <a:t>Expressions</a:t>
+            </a:r>
+            <a:endParaRPr lang="en-CA" dirty="0">
+              <a:latin typeface="+mn-lt"/>
+            </a:endParaRPr>
+          </a:p>
+        </p:txBody>
+      </p:sp>
+      <p:sp>
+        <p:nvSpPr>
+          <p:cNvPr id="4" name="AutoShape 2" descr="https://datahub.berkeley.edu/user/hubertluo/files/materials-sp19/materials/sp19/lab/lab02/statement.png"/>
+          <p:cNvSpPr>
+            <a:spLocks noChangeAspect="1" noChangeArrowheads="1"/>
+          </p:cNvSpPr>
+          <p:nvPr/>
+        </p:nvSpPr>
+        <p:spPr bwMode="auto">
+          <a:xfrm>
+            <a:off x="155575" y="-144463"/>
+            <a:ext cx="304800" cy="304801"/>
+          </a:xfrm>
+          <a:prstGeom prst="rect">
+            <a:avLst/>
+          </a:prstGeom>
+          <a:noFill/>
+          <a:extLst>
+            <a:ext uri="{909E8E84-426E-40DD-AFC4-6F175D3DCCD1}">
+              <a14:hiddenFill xmlns:a14="http://schemas.microsoft.com/office/drawing/2010/main">
+                <a:solidFill>
+                  <a:srgbClr val="FFFFFF"/>
+                </a:solidFill>
+              </a14:hiddenFill>
+            </a:ext>
+          </a:extLst>
+        </p:spPr>
+        <p:txBody>
+          <a:bodyPr vert="horz" wrap="square" lIns="91440" tIns="45720" rIns="91440" bIns="45720" numCol="1" anchor="t" anchorCtr="0" compatLnSpc="1">
+            <a:prstTxWarp prst="textNoShape">
+              <a:avLst/>
+            </a:prstTxWarp>
+          </a:bodyPr>
+          <a:lstStyle/>
+          <a:p>
+            <a:endParaRPr lang="en-CA"/>
+          </a:p>
+        </p:txBody>
+      </p:sp>
+      <p:sp>
+        <p:nvSpPr>
+          <p:cNvPr id="5" name="AutoShape 2" descr="https://datahub.berkeley.edu/user/hubertluo/files/materials-sp19/materials/sp19/lab/lab02/statement.png"/>
+          <p:cNvSpPr>
+            <a:spLocks noChangeAspect="1" noChangeArrowheads="1"/>
+          </p:cNvSpPr>
+          <p:nvPr/>
+        </p:nvSpPr>
+        <p:spPr bwMode="auto">
+          <a:xfrm>
+            <a:off x="307975" y="7937"/>
+            <a:ext cx="304800" cy="304801"/>
+          </a:xfrm>
+          <a:prstGeom prst="rect">
+            <a:avLst/>
+          </a:prstGeom>
+          <a:noFill/>
+          <a:extLst>
+            <a:ext uri="{909E8E84-426E-40DD-AFC4-6F175D3DCCD1}">
+              <a14:hiddenFill xmlns:a14="http://schemas.microsoft.com/office/drawing/2010/main">
+                <a:solidFill>
+                  <a:srgbClr val="FFFFFF"/>
+                </a:solidFill>
+              </a14:hiddenFill>
+            </a:ext>
+          </a:extLst>
+        </p:spPr>
+        <p:txBody>
+          <a:bodyPr vert="horz" wrap="square" lIns="91440" tIns="45720" rIns="91440" bIns="45720" numCol="1" anchor="t" anchorCtr="0" compatLnSpc="1">
+            <a:prstTxWarp prst="textNoShape">
+              <a:avLst/>
+            </a:prstTxWarp>
+          </a:bodyPr>
+          <a:lstStyle/>
+          <a:p>
+            <a:endParaRPr lang="en-CA"/>
+          </a:p>
+        </p:txBody>
+      </p:sp>
+      <p:pic>
+        <p:nvPicPr>
+          <p:cNvPr id="11" name="Content Placeholder 10"/>
+          <p:cNvPicPr>
+            <a:picLocks noGrp="1" noChangeAspect="1"/>
+          </p:cNvPicPr>
+          <p:nvPr>
+            <p:ph idx="1"/>
+          </p:nvPr>
+        </p:nvPicPr>
+        <p:blipFill>
+          <a:blip r:embed="rId2">
+            <a:extLst>
+              <a:ext uri="{28A0092B-C50C-407E-A947-70E740481C1C}">
+                <a14:useLocalDpi xmlns:a14="http://schemas.microsoft.com/office/drawing/2010/main" val="0"/>
+              </a:ext>
+            </a:extLst>
+          </a:blip>
+          <a:stretch>
+            <a:fillRect/>
+          </a:stretch>
+        </p:blipFill>
+        <p:spPr>
+          <a:xfrm>
+            <a:off x="360091" y="1989931"/>
+            <a:ext cx="8423819" cy="2878138"/>
+          </a:xfrm>
+        </p:spPr>
+      </p:pic>
+      <p:sp>
+        <p:nvSpPr>
+          <p:cNvPr id="7" name="AutoShape 4" descr="https://datahub.berkeley.edu/user/hubertluo/files/materials-sp19/materials/sp19/lab/lab02/statement.png"/>
+          <p:cNvSpPr>
+            <a:spLocks noChangeAspect="1" noChangeArrowheads="1"/>
+          </p:cNvSpPr>
+          <p:nvPr/>
+        </p:nvSpPr>
+        <p:spPr bwMode="auto">
+          <a:xfrm>
+            <a:off x="460375" y="160337"/>
+            <a:ext cx="304800" cy="304801"/>
+          </a:xfrm>
+          <a:prstGeom prst="rect">
+            <a:avLst/>
+          </a:prstGeom>
+          <a:noFill/>
+          <a:extLst>
+            <a:ext uri="{909E8E84-426E-40DD-AFC4-6F175D3DCCD1}">
+              <a14:hiddenFill xmlns:a14="http://schemas.microsoft.com/office/drawing/2010/main">
+                <a:solidFill>
+                  <a:srgbClr val="FFFFFF"/>
+                </a:solidFill>
+              </a14:hiddenFill>
+            </a:ext>
+          </a:extLst>
+        </p:spPr>
+        <p:txBody>
+          <a:bodyPr vert="horz" wrap="square" lIns="91440" tIns="45720" rIns="91440" bIns="45720" numCol="1" anchor="t" anchorCtr="0" compatLnSpc="1">
+            <a:prstTxWarp prst="textNoShape">
+              <a:avLst/>
+            </a:prstTxWarp>
+          </a:bodyPr>
+          <a:lstStyle/>
+          <a:p>
+            <a:endParaRPr lang="en-CA"/>
+          </a:p>
+        </p:txBody>
+      </p:sp>
+      <p:sp>
+        <p:nvSpPr>
+          <p:cNvPr id="8" name="AutoShape 6" descr="https://datahub.berkeley.edu/user/hubertluo/files/materials-sp19/materials/sp19/lab/lab02/statement.png"/>
+          <p:cNvSpPr>
+            <a:spLocks noChangeAspect="1" noChangeArrowheads="1"/>
+          </p:cNvSpPr>
+          <p:nvPr/>
+        </p:nvSpPr>
+        <p:spPr bwMode="auto">
+          <a:xfrm>
+            <a:off x="612775" y="312737"/>
+            <a:ext cx="304800" cy="304801"/>
+          </a:xfrm>
+          <a:prstGeom prst="rect">
+            <a:avLst/>
+          </a:prstGeom>
+          <a:noFill/>
+          <a:extLst>
+            <a:ext uri="{909E8E84-426E-40DD-AFC4-6F175D3DCCD1}">
+              <a14:hiddenFill xmlns:a14="http://schemas.microsoft.com/office/drawing/2010/main">
+                <a:solidFill>
+                  <a:srgbClr val="FFFFFF"/>
+                </a:solidFill>
+              </a14:hiddenFill>
+            </a:ext>
+          </a:extLst>
+        </p:spPr>
+        <p:txBody>
+          <a:bodyPr vert="horz" wrap="square" lIns="91440" tIns="45720" rIns="91440" bIns="45720" numCol="1" anchor="t" anchorCtr="0" compatLnSpc="1">
+            <a:prstTxWarp prst="textNoShape">
+              <a:avLst/>
+            </a:prstTxWarp>
+          </a:bodyPr>
+          <a:lstStyle/>
+          <a:p>
+            <a:endParaRPr lang="en-CA"/>
+          </a:p>
+        </p:txBody>
+      </p:sp>
+      <p:sp>
+        <p:nvSpPr>
+          <p:cNvPr id="9" name="AutoShape 8" descr="https://datahub.berkeley.edu/user/hubertluo/files/materials-sp19/materials/sp19/lab/lab02/statement.png"/>
+          <p:cNvSpPr>
+            <a:spLocks noChangeAspect="1" noChangeArrowheads="1"/>
+          </p:cNvSpPr>
+          <p:nvPr/>
+        </p:nvSpPr>
+        <p:spPr bwMode="auto">
+          <a:xfrm>
+            <a:off x="765175" y="465137"/>
+            <a:ext cx="304800" cy="304801"/>
+          </a:xfrm>
+          <a:prstGeom prst="rect">
+            <a:avLst/>
+          </a:prstGeom>
+          <a:noFill/>
+          <a:extLst>
+            <a:ext uri="{909E8E84-426E-40DD-AFC4-6F175D3DCCD1}">
+              <a14:hiddenFill xmlns:a14="http://schemas.microsoft.com/office/drawing/2010/main">
+                <a:solidFill>
+                  <a:srgbClr val="FFFFFF"/>
+                </a:solidFill>
+              </a14:hiddenFill>
+            </a:ext>
+          </a:extLst>
+        </p:spPr>
+        <p:txBody>
+          <a:bodyPr vert="horz" wrap="square" lIns="91440" tIns="45720" rIns="91440" bIns="45720" numCol="1" anchor="t" anchorCtr="0" compatLnSpc="1">
+            <a:prstTxWarp prst="textNoShape">
+              <a:avLst/>
+            </a:prstTxWarp>
+          </a:bodyPr>
+          <a:lstStyle/>
+          <a:p>
+            <a:endParaRPr lang="en-CA"/>
+          </a:p>
+        </p:txBody>
+      </p:sp>
+    </p:spTree>
+    <p:extLst>
+      <p:ext uri="{BB962C8B-B14F-4D97-AF65-F5344CB8AC3E}">
+        <p14:creationId xmlns:p14="http://schemas.microsoft.com/office/powerpoint/2010/main" val="4126072053"/>
       </p:ext>
     </p:extLst>
   </p:cSld>
@@ -8759,7 +10446,7 @@
               <a:rPr lang="en-CA" dirty="0" smtClean="0">
                 <a:latin typeface="+mn-lt"/>
               </a:rPr>
-              <a:t>Causality</a:t>
+              <a:t>Agenda</a:t>
             </a:r>
             <a:endParaRPr lang="en-CA" dirty="0">
               <a:latin typeface="+mn-lt"/>
@@ -8787,65 +10474,54 @@
           <a:bodyPr/>
           <a:lstStyle/>
           <a:p>
+            <a:pPr marL="514350" indent="-457200">
+              <a:buFont typeface="+mj-lt"/>
+              <a:buAutoNum type="arabicPeriod"/>
+            </a:pPr>
             <a:r>
               <a:rPr lang="en-CA" dirty="0" smtClean="0">
                 <a:latin typeface="Avenir LT Std 45 Book" pitchFamily="34" charset="0"/>
               </a:rPr>
-              <a:t>Treatment: Factor of interest </a:t>
-            </a:r>
-          </a:p>
-          <a:p>
+              <a:t>Causality </a:t>
+            </a:r>
+          </a:p>
+          <a:p>
+            <a:pPr marL="514350" indent="-457200">
+              <a:buFont typeface="+mj-lt"/>
+              <a:buAutoNum type="arabicPeriod"/>
+            </a:pPr>
             <a:r>
               <a:rPr lang="en-CA" dirty="0" smtClean="0">
                 <a:latin typeface="Avenir LT Std 45 Book" pitchFamily="34" charset="0"/>
               </a:rPr>
-              <a:t>Outcome: What is being measured</a:t>
-            </a:r>
-          </a:p>
-          <a:p>
-            <a:pPr marL="0" indent="0">
-              <a:buNone/>
+              <a:t>Expressions: Variables and Function Calls</a:t>
+            </a:r>
+          </a:p>
+          <a:p>
+            <a:pPr marL="514350" indent="-457200">
+              <a:buFont typeface="+mj-lt"/>
+              <a:buAutoNum type="arabicPeriod"/>
             </a:pPr>
+            <a:r>
+              <a:rPr lang="en-CA" dirty="0" smtClean="0">
+                <a:latin typeface="Avenir LT Std 45 Book" pitchFamily="34" charset="0"/>
+              </a:rPr>
+              <a:t>Some Tables Operations</a:t>
+            </a:r>
             <a:endParaRPr lang="en-CA" dirty="0" smtClean="0">
               <a:latin typeface="Avenir LT Std 45 Book" pitchFamily="34" charset="0"/>
             </a:endParaRPr>
           </a:p>
           <a:p>
+            <a:pPr marL="514350" indent="-457200">
+              <a:buFont typeface="+mj-lt"/>
+              <a:buAutoNum type="arabicPeriod"/>
+            </a:pPr>
             <a:r>
               <a:rPr lang="en-CA" dirty="0" smtClean="0">
                 <a:latin typeface="Avenir LT Std 45 Book" pitchFamily="34" charset="0"/>
               </a:rPr>
-              <a:t>Example: Study the effect of capital punishment on a state’s murder rate</a:t>
-            </a:r>
-          </a:p>
-          <a:p>
-            <a:pPr lvl="1"/>
-            <a:r>
-              <a:rPr lang="en-CA" dirty="0" smtClean="0">
-                <a:latin typeface="Avenir LT Std 45 Book" pitchFamily="34" charset="0"/>
-              </a:rPr>
-              <a:t>Treatment: </a:t>
-            </a:r>
-            <a:r>
-              <a:rPr lang="en-CA" dirty="0">
-                <a:latin typeface="Avenir LT Std 45 Book" pitchFamily="34" charset="0"/>
-              </a:rPr>
-              <a:t>Whether a state has capital </a:t>
-            </a:r>
-            <a:r>
-              <a:rPr lang="en-CA" dirty="0" smtClean="0">
-                <a:latin typeface="Avenir LT Std 45 Book" pitchFamily="34" charset="0"/>
-              </a:rPr>
-              <a:t>punishment</a:t>
-            </a:r>
-          </a:p>
-          <a:p>
-            <a:pPr lvl="1"/>
-            <a:r>
-              <a:rPr lang="en-CA" dirty="0" smtClean="0">
-                <a:latin typeface="Avenir LT Std 45 Book" pitchFamily="34" charset="0"/>
-              </a:rPr>
-              <a:t>Outcome: A state’s murder rate</a:t>
+              <a:t>Lab Notebook</a:t>
             </a:r>
             <a:endParaRPr lang="en-CA" dirty="0">
               <a:latin typeface="Avenir LT Std 45 Book" pitchFamily="34" charset="0"/>
@@ -8857,6 +10533,1549 @@
     <p:extLst>
       <p:ext uri="{BB962C8B-B14F-4D97-AF65-F5344CB8AC3E}">
         <p14:creationId xmlns:p14="http://schemas.microsoft.com/office/powerpoint/2010/main" val="1544152936"/>
+      </p:ext>
+    </p:extLst>
+  </p:cSld>
+  <p:clrMapOvr>
+    <a:masterClrMapping/>
+  </p:clrMapOvr>
+  <p:timing>
+    <p:tnLst>
+      <p:par>
+        <p:cTn id="1" dur="indefinite" restart="never" nodeType="tmRoot"/>
+      </p:par>
+    </p:tnLst>
+  </p:timing>
+</p:sld>
+</file>
+
+<file path=ppt/slides/slide20.xml><?xml version="1.0" encoding="utf-8"?>
+<p:sld xmlns:a="http://schemas.openxmlformats.org/drawingml/2006/main" xmlns:r="http://schemas.openxmlformats.org/officeDocument/2006/relationships" xmlns:p="http://schemas.openxmlformats.org/presentationml/2006/main">
+  <p:cSld>
+    <p:spTree>
+      <p:nvGrpSpPr>
+        <p:cNvPr id="1" name=""/>
+        <p:cNvGrpSpPr/>
+        <p:nvPr/>
+      </p:nvGrpSpPr>
+      <p:grpSpPr>
+        <a:xfrm>
+          <a:off x="0" y="0"/>
+          <a:ext cx="0" cy="0"/>
+          <a:chOff x="0" y="0"/>
+          <a:chExt cx="0" cy="0"/>
+        </a:xfrm>
+      </p:grpSpPr>
+      <p:sp>
+        <p:nvSpPr>
+          <p:cNvPr id="2" name="Title 1"/>
+          <p:cNvSpPr>
+            <a:spLocks noGrp="1"/>
+          </p:cNvSpPr>
+          <p:nvPr>
+            <p:ph type="title"/>
+          </p:nvPr>
+        </p:nvSpPr>
+        <p:spPr>
+          <a:xfrm>
+            <a:off x="457200" y="449932"/>
+            <a:ext cx="8286750" cy="1150353"/>
+          </a:xfrm>
+        </p:spPr>
+        <p:txBody>
+          <a:bodyPr>
+            <a:normAutofit/>
+          </a:bodyPr>
+          <a:lstStyle/>
+          <a:p>
+            <a:r>
+              <a:rPr lang="en-CA" dirty="0" smtClean="0">
+                <a:latin typeface="+mn-lt"/>
+              </a:rPr>
+              <a:t>Expressions: Demo</a:t>
+            </a:r>
+            <a:endParaRPr lang="en-CA" dirty="0">
+              <a:latin typeface="+mn-lt"/>
+            </a:endParaRPr>
+          </a:p>
+        </p:txBody>
+      </p:sp>
+      <p:sp>
+        <p:nvSpPr>
+          <p:cNvPr id="4" name="AutoShape 2" descr="https://datahub.berkeley.edu/user/hubertluo/files/materials-sp19/materials/sp19/lab/lab02/statement.png"/>
+          <p:cNvSpPr>
+            <a:spLocks noChangeAspect="1" noChangeArrowheads="1"/>
+          </p:cNvSpPr>
+          <p:nvPr/>
+        </p:nvSpPr>
+        <p:spPr bwMode="auto">
+          <a:xfrm>
+            <a:off x="155575" y="-144463"/>
+            <a:ext cx="304800" cy="304801"/>
+          </a:xfrm>
+          <a:prstGeom prst="rect">
+            <a:avLst/>
+          </a:prstGeom>
+          <a:noFill/>
+          <a:extLst>
+            <a:ext uri="{909E8E84-426E-40DD-AFC4-6F175D3DCCD1}">
+              <a14:hiddenFill xmlns:a14="http://schemas.microsoft.com/office/drawing/2010/main">
+                <a:solidFill>
+                  <a:srgbClr val="FFFFFF"/>
+                </a:solidFill>
+              </a14:hiddenFill>
+            </a:ext>
+          </a:extLst>
+        </p:spPr>
+        <p:txBody>
+          <a:bodyPr vert="horz" wrap="square" lIns="91440" tIns="45720" rIns="91440" bIns="45720" numCol="1" anchor="t" anchorCtr="0" compatLnSpc="1">
+            <a:prstTxWarp prst="textNoShape">
+              <a:avLst/>
+            </a:prstTxWarp>
+          </a:bodyPr>
+          <a:lstStyle/>
+          <a:p>
+            <a:endParaRPr lang="en-CA"/>
+          </a:p>
+        </p:txBody>
+      </p:sp>
+      <p:sp>
+        <p:nvSpPr>
+          <p:cNvPr id="3" name="Content Placeholder 2"/>
+          <p:cNvSpPr>
+            <a:spLocks noGrp="1"/>
+          </p:cNvSpPr>
+          <p:nvPr>
+            <p:ph idx="1"/>
+          </p:nvPr>
+        </p:nvSpPr>
+        <p:spPr/>
+        <p:txBody>
+          <a:bodyPr/>
+          <a:lstStyle/>
+          <a:p>
+            <a:r>
+              <a:rPr lang="en-CA" dirty="0" smtClean="0"/>
+              <a:t>(Demo on Notebook)</a:t>
+            </a:r>
+            <a:endParaRPr lang="en-CA" dirty="0"/>
+          </a:p>
+        </p:txBody>
+      </p:sp>
+    </p:spTree>
+    <p:extLst>
+      <p:ext uri="{BB962C8B-B14F-4D97-AF65-F5344CB8AC3E}">
+        <p14:creationId xmlns:p14="http://schemas.microsoft.com/office/powerpoint/2010/main" val="14097592"/>
+      </p:ext>
+    </p:extLst>
+  </p:cSld>
+  <p:clrMapOvr>
+    <a:masterClrMapping/>
+  </p:clrMapOvr>
+  <p:timing>
+    <p:tnLst>
+      <p:par>
+        <p:cTn id="1" dur="indefinite" restart="never" nodeType="tmRoot"/>
+      </p:par>
+    </p:tnLst>
+  </p:timing>
+</p:sld>
+</file>
+
+<file path=ppt/slides/slide21.xml><?xml version="1.0" encoding="utf-8"?>
+<p:sld xmlns:a="http://schemas.openxmlformats.org/drawingml/2006/main" xmlns:r="http://schemas.openxmlformats.org/officeDocument/2006/relationships" xmlns:p="http://schemas.openxmlformats.org/presentationml/2006/main">
+  <p:cSld>
+    <p:spTree>
+      <p:nvGrpSpPr>
+        <p:cNvPr id="1" name=""/>
+        <p:cNvGrpSpPr/>
+        <p:nvPr/>
+      </p:nvGrpSpPr>
+      <p:grpSpPr>
+        <a:xfrm>
+          <a:off x="0" y="0"/>
+          <a:ext cx="0" cy="0"/>
+          <a:chOff x="0" y="0"/>
+          <a:chExt cx="0" cy="0"/>
+        </a:xfrm>
+      </p:grpSpPr>
+      <p:sp>
+        <p:nvSpPr>
+          <p:cNvPr id="2" name="Title 1"/>
+          <p:cNvSpPr>
+            <a:spLocks noGrp="1"/>
+          </p:cNvSpPr>
+          <p:nvPr>
+            <p:ph type="title"/>
+          </p:nvPr>
+        </p:nvSpPr>
+        <p:spPr>
+          <a:xfrm>
+            <a:off x="457200" y="449932"/>
+            <a:ext cx="8286750" cy="1150353"/>
+          </a:xfrm>
+        </p:spPr>
+        <p:txBody>
+          <a:bodyPr>
+            <a:normAutofit/>
+          </a:bodyPr>
+          <a:lstStyle/>
+          <a:p>
+            <a:r>
+              <a:rPr lang="en-CA" dirty="0" smtClean="0">
+                <a:latin typeface="+mn-lt"/>
+              </a:rPr>
+              <a:t>Some Table Operations</a:t>
+            </a:r>
+            <a:endParaRPr lang="en-CA" dirty="0">
+              <a:latin typeface="+mn-lt"/>
+            </a:endParaRPr>
+          </a:p>
+        </p:txBody>
+      </p:sp>
+      <p:graphicFrame>
+        <p:nvGraphicFramePr>
+          <p:cNvPr id="5" name="Content Placeholder 4"/>
+          <p:cNvGraphicFramePr>
+            <a:graphicFrameLocks noGrp="1"/>
+          </p:cNvGraphicFramePr>
+          <p:nvPr>
+            <p:ph idx="1"/>
+            <p:extLst>
+              <p:ext uri="{D42A27DB-BD31-4B8C-83A1-F6EECF244321}">
+                <p14:modId xmlns:p14="http://schemas.microsoft.com/office/powerpoint/2010/main" val="752024728"/>
+              </p:ext>
+            </p:extLst>
+          </p:nvPr>
+        </p:nvGraphicFramePr>
+        <p:xfrm>
+          <a:off x="539750" y="1419309"/>
+          <a:ext cx="7947025" cy="4095665"/>
+        </p:xfrm>
+        <a:graphic>
+          <a:graphicData uri="http://schemas.openxmlformats.org/drawingml/2006/table">
+            <a:tbl>
+              <a:tblPr firstRow="1" bandRow="1">
+                <a:tableStyleId>{5C22544A-7EE6-4342-B048-85BDC9FD1C3A}</a:tableStyleId>
+              </a:tblPr>
+              <a:tblGrid>
+                <a:gridCol w="1689100"/>
+                <a:gridCol w="4276725"/>
+                <a:gridCol w="1981200"/>
+              </a:tblGrid>
+              <a:tr h="442939">
+                <a:tc>
+                  <a:txBody>
+                    <a:bodyPr/>
+                    <a:lstStyle/>
+                    <a:p>
+                      <a:pPr algn="ctr" fontAlgn="ctr"/>
+                      <a:r>
+                        <a:rPr lang="en-CA" sz="1600" b="1" dirty="0">
+                          <a:effectLst/>
+                        </a:rPr>
+                        <a:t>Name</a:t>
+                      </a:r>
+                    </a:p>
+                  </a:txBody>
+                  <a:tcPr anchor="ctr"/>
+                </a:tc>
+                <a:tc>
+                  <a:txBody>
+                    <a:bodyPr/>
+                    <a:lstStyle/>
+                    <a:p>
+                      <a:pPr algn="ctr" fontAlgn="ctr"/>
+                      <a:r>
+                        <a:rPr lang="en-CA" sz="1600" b="1" dirty="0">
+                          <a:effectLst/>
+                        </a:rPr>
+                        <a:t>Purpose</a:t>
+                      </a:r>
+                    </a:p>
+                  </a:txBody>
+                  <a:tcPr anchor="ctr"/>
+                </a:tc>
+                <a:tc>
+                  <a:txBody>
+                    <a:bodyPr/>
+                    <a:lstStyle/>
+                    <a:p>
+                      <a:pPr algn="ctr" fontAlgn="ctr"/>
+                      <a:r>
+                        <a:rPr lang="en-CA" sz="1600" b="1" dirty="0">
+                          <a:effectLst/>
+                        </a:rPr>
+                        <a:t>Example</a:t>
+                      </a:r>
+                    </a:p>
+                  </a:txBody>
+                  <a:tcPr anchor="ctr"/>
+                </a:tc>
+              </a:tr>
+              <a:tr h="691712">
+                <a:tc>
+                  <a:txBody>
+                    <a:bodyPr/>
+                    <a:lstStyle/>
+                    <a:p>
+                      <a:pPr algn="ctr" fontAlgn="ctr"/>
+                      <a:r>
+                        <a:rPr lang="en-CA" sz="1600">
+                          <a:effectLst/>
+                        </a:rPr>
+                        <a:t>sort</a:t>
+                      </a:r>
+                    </a:p>
+                  </a:txBody>
+                  <a:tcPr anchor="ctr"/>
+                </a:tc>
+                <a:tc>
+                  <a:txBody>
+                    <a:bodyPr/>
+                    <a:lstStyle/>
+                    <a:p>
+                      <a:pPr algn="ctr" fontAlgn="ctr"/>
+                      <a:r>
+                        <a:rPr lang="en-CA" sz="1600" dirty="0">
+                          <a:effectLst/>
+                        </a:rPr>
+                        <a:t>Create a copy of a table sorted by the values in a column</a:t>
+                      </a:r>
+                    </a:p>
+                  </a:txBody>
+                  <a:tcPr anchor="ctr"/>
+                </a:tc>
+                <a:tc>
+                  <a:txBody>
+                    <a:bodyPr/>
+                    <a:lstStyle/>
+                    <a:p>
+                      <a:pPr algn="ctr" fontAlgn="ctr"/>
+                      <a:r>
+                        <a:rPr lang="en-CA" sz="1600" dirty="0" err="1">
+                          <a:effectLst/>
+                        </a:rPr>
+                        <a:t>tbl.sort</a:t>
+                      </a:r>
+                      <a:r>
+                        <a:rPr lang="en-CA" sz="1600" dirty="0">
+                          <a:effectLst/>
+                        </a:rPr>
+                        <a:t>("N")</a:t>
+                      </a:r>
+                    </a:p>
+                  </a:txBody>
+                  <a:tcPr anchor="ctr"/>
+                </a:tc>
+              </a:tr>
+              <a:tr h="691712">
+                <a:tc>
+                  <a:txBody>
+                    <a:bodyPr/>
+                    <a:lstStyle/>
+                    <a:p>
+                      <a:pPr algn="ctr" fontAlgn="ctr"/>
+                      <a:r>
+                        <a:rPr lang="en-CA" sz="1600" dirty="0">
+                          <a:effectLst/>
+                        </a:rPr>
+                        <a:t>where</a:t>
+                      </a:r>
+                    </a:p>
+                  </a:txBody>
+                  <a:tcPr anchor="ctr"/>
+                </a:tc>
+                <a:tc>
+                  <a:txBody>
+                    <a:bodyPr/>
+                    <a:lstStyle/>
+                    <a:p>
+                      <a:pPr algn="ctr" fontAlgn="ctr"/>
+                      <a:r>
+                        <a:rPr lang="en-CA" sz="1600" dirty="0">
+                          <a:effectLst/>
+                        </a:rPr>
+                        <a:t>Create a copy of a table with only the rows that match some </a:t>
+                      </a:r>
+                      <a:r>
+                        <a:rPr lang="en-CA" sz="1600" i="1" dirty="0">
+                          <a:effectLst/>
+                        </a:rPr>
+                        <a:t>predicate</a:t>
+                      </a:r>
+                      <a:endParaRPr lang="en-CA" sz="1600" dirty="0">
+                        <a:effectLst/>
+                      </a:endParaRPr>
+                    </a:p>
+                  </a:txBody>
+                  <a:tcPr anchor="ctr"/>
+                </a:tc>
+                <a:tc>
+                  <a:txBody>
+                    <a:bodyPr/>
+                    <a:lstStyle/>
+                    <a:p>
+                      <a:pPr algn="ctr" fontAlgn="ctr"/>
+                      <a:r>
+                        <a:rPr lang="en-CA" sz="1600" dirty="0" err="1">
+                          <a:effectLst/>
+                        </a:rPr>
+                        <a:t>tbl.where</a:t>
+                      </a:r>
+                      <a:r>
+                        <a:rPr lang="en-CA" sz="1600" dirty="0">
+                          <a:effectLst/>
+                        </a:rPr>
+                        <a:t>("N", </a:t>
+                      </a:r>
+                      <a:r>
+                        <a:rPr lang="en-CA" sz="1600" dirty="0" err="1">
+                          <a:effectLst/>
+                        </a:rPr>
+                        <a:t>are.above</a:t>
+                      </a:r>
+                      <a:r>
+                        <a:rPr lang="en-CA" sz="1600" dirty="0">
+                          <a:effectLst/>
+                        </a:rPr>
+                        <a:t>(2))</a:t>
+                      </a:r>
+                    </a:p>
+                  </a:txBody>
+                  <a:tcPr anchor="ctr"/>
+                </a:tc>
+              </a:tr>
+              <a:tr h="442939">
+                <a:tc>
+                  <a:txBody>
+                    <a:bodyPr/>
+                    <a:lstStyle/>
+                    <a:p>
+                      <a:pPr algn="ctr" fontAlgn="ctr"/>
+                      <a:r>
+                        <a:rPr lang="en-CA" sz="1600">
+                          <a:effectLst/>
+                        </a:rPr>
+                        <a:t>num_rows</a:t>
+                      </a:r>
+                    </a:p>
+                  </a:txBody>
+                  <a:tcPr anchor="ctr"/>
+                </a:tc>
+                <a:tc>
+                  <a:txBody>
+                    <a:bodyPr/>
+                    <a:lstStyle/>
+                    <a:p>
+                      <a:pPr algn="ctr" fontAlgn="ctr"/>
+                      <a:r>
+                        <a:rPr lang="en-CA" sz="1600" dirty="0">
+                          <a:effectLst/>
+                        </a:rPr>
+                        <a:t>Compute the number of rows in a table</a:t>
+                      </a:r>
+                    </a:p>
+                  </a:txBody>
+                  <a:tcPr anchor="ctr"/>
+                </a:tc>
+                <a:tc>
+                  <a:txBody>
+                    <a:bodyPr/>
+                    <a:lstStyle/>
+                    <a:p>
+                      <a:pPr algn="ctr" fontAlgn="ctr"/>
+                      <a:r>
+                        <a:rPr lang="en-CA" sz="1600">
+                          <a:effectLst/>
+                        </a:rPr>
+                        <a:t>tbl.num_rows</a:t>
+                      </a:r>
+                    </a:p>
+                  </a:txBody>
+                  <a:tcPr anchor="ctr"/>
+                </a:tc>
+              </a:tr>
+              <a:tr h="442939">
+                <a:tc>
+                  <a:txBody>
+                    <a:bodyPr/>
+                    <a:lstStyle/>
+                    <a:p>
+                      <a:pPr algn="ctr" fontAlgn="ctr"/>
+                      <a:r>
+                        <a:rPr lang="en-CA" sz="1600">
+                          <a:effectLst/>
+                        </a:rPr>
+                        <a:t>num_columns</a:t>
+                      </a:r>
+                    </a:p>
+                  </a:txBody>
+                  <a:tcPr anchor="ctr"/>
+                </a:tc>
+                <a:tc>
+                  <a:txBody>
+                    <a:bodyPr/>
+                    <a:lstStyle/>
+                    <a:p>
+                      <a:pPr algn="ctr" fontAlgn="ctr"/>
+                      <a:r>
+                        <a:rPr lang="en-CA" sz="1600" dirty="0">
+                          <a:effectLst/>
+                        </a:rPr>
+                        <a:t>Compute the number of columns in a table</a:t>
+                      </a:r>
+                    </a:p>
+                  </a:txBody>
+                  <a:tcPr anchor="ctr"/>
+                </a:tc>
+                <a:tc>
+                  <a:txBody>
+                    <a:bodyPr/>
+                    <a:lstStyle/>
+                    <a:p>
+                      <a:pPr algn="ctr" fontAlgn="ctr"/>
+                      <a:r>
+                        <a:rPr lang="en-CA" sz="1600">
+                          <a:effectLst/>
+                        </a:rPr>
+                        <a:t>tbl.num_columns</a:t>
+                      </a:r>
+                    </a:p>
+                  </a:txBody>
+                  <a:tcPr anchor="ctr"/>
+                </a:tc>
+              </a:tr>
+              <a:tr h="691712">
+                <a:tc>
+                  <a:txBody>
+                    <a:bodyPr/>
+                    <a:lstStyle/>
+                    <a:p>
+                      <a:pPr algn="ctr" fontAlgn="ctr"/>
+                      <a:r>
+                        <a:rPr lang="en-CA" sz="1600">
+                          <a:effectLst/>
+                        </a:rPr>
+                        <a:t>select</a:t>
+                      </a:r>
+                    </a:p>
+                  </a:txBody>
+                  <a:tcPr anchor="ctr"/>
+                </a:tc>
+                <a:tc>
+                  <a:txBody>
+                    <a:bodyPr/>
+                    <a:lstStyle/>
+                    <a:p>
+                      <a:pPr algn="ctr" fontAlgn="ctr"/>
+                      <a:r>
+                        <a:rPr lang="en-CA" sz="1600" dirty="0">
+                          <a:effectLst/>
+                        </a:rPr>
+                        <a:t>Create a copy of a table with only some of the columns</a:t>
+                      </a:r>
+                    </a:p>
+                  </a:txBody>
+                  <a:tcPr anchor="ctr"/>
+                </a:tc>
+                <a:tc>
+                  <a:txBody>
+                    <a:bodyPr/>
+                    <a:lstStyle/>
+                    <a:p>
+                      <a:pPr algn="ctr" fontAlgn="ctr"/>
+                      <a:r>
+                        <a:rPr lang="en-CA" sz="1600">
+                          <a:effectLst/>
+                        </a:rPr>
+                        <a:t>tbl.select("N")</a:t>
+                      </a:r>
+                    </a:p>
+                  </a:txBody>
+                  <a:tcPr anchor="ctr"/>
+                </a:tc>
+              </a:tr>
+              <a:tr h="691712">
+                <a:tc>
+                  <a:txBody>
+                    <a:bodyPr/>
+                    <a:lstStyle/>
+                    <a:p>
+                      <a:pPr algn="ctr" fontAlgn="ctr"/>
+                      <a:r>
+                        <a:rPr lang="en-CA" sz="1600">
+                          <a:effectLst/>
+                        </a:rPr>
+                        <a:t>drop</a:t>
+                      </a:r>
+                    </a:p>
+                  </a:txBody>
+                  <a:tcPr anchor="ctr"/>
+                </a:tc>
+                <a:tc>
+                  <a:txBody>
+                    <a:bodyPr/>
+                    <a:lstStyle/>
+                    <a:p>
+                      <a:pPr algn="ctr" fontAlgn="ctr"/>
+                      <a:r>
+                        <a:rPr lang="en-CA" sz="1600" dirty="0">
+                          <a:effectLst/>
+                        </a:rPr>
+                        <a:t>Create a copy of a table without some of the columns</a:t>
+                      </a:r>
+                    </a:p>
+                  </a:txBody>
+                  <a:tcPr anchor="ctr"/>
+                </a:tc>
+                <a:tc>
+                  <a:txBody>
+                    <a:bodyPr/>
+                    <a:lstStyle/>
+                    <a:p>
+                      <a:pPr algn="ctr" fontAlgn="ctr"/>
+                      <a:r>
+                        <a:rPr lang="en-CA" sz="1600" dirty="0" err="1">
+                          <a:effectLst/>
+                        </a:rPr>
+                        <a:t>tbl.drop</a:t>
+                      </a:r>
+                      <a:r>
+                        <a:rPr lang="en-CA" sz="1600" dirty="0" smtClean="0">
+                          <a:effectLst/>
+                        </a:rPr>
+                        <a:t>("N</a:t>
+                      </a:r>
+                      <a:r>
+                        <a:rPr lang="en-CA" sz="1600" dirty="0">
+                          <a:effectLst/>
+                        </a:rPr>
+                        <a:t>")</a:t>
+                      </a:r>
+                    </a:p>
+                  </a:txBody>
+                  <a:tcPr anchor="ctr"/>
+                </a:tc>
+              </a:tr>
+            </a:tbl>
+          </a:graphicData>
+        </a:graphic>
+      </p:graphicFrame>
+    </p:spTree>
+    <p:extLst>
+      <p:ext uri="{BB962C8B-B14F-4D97-AF65-F5344CB8AC3E}">
+        <p14:creationId xmlns:p14="http://schemas.microsoft.com/office/powerpoint/2010/main" val="3672412553"/>
+      </p:ext>
+    </p:extLst>
+  </p:cSld>
+  <p:clrMapOvr>
+    <a:masterClrMapping/>
+  </p:clrMapOvr>
+  <p:timing>
+    <p:tnLst>
+      <p:par>
+        <p:cTn id="1" dur="indefinite" restart="never" nodeType="tmRoot"/>
+      </p:par>
+    </p:tnLst>
+  </p:timing>
+</p:sld>
+</file>
+
+<file path=ppt/slides/slide22.xml><?xml version="1.0" encoding="utf-8"?>
+<p:sld xmlns:a="http://schemas.openxmlformats.org/drawingml/2006/main" xmlns:r="http://schemas.openxmlformats.org/officeDocument/2006/relationships" xmlns:p="http://schemas.openxmlformats.org/presentationml/2006/main">
+  <p:cSld>
+    <p:spTree>
+      <p:nvGrpSpPr>
+        <p:cNvPr id="1" name=""/>
+        <p:cNvGrpSpPr/>
+        <p:nvPr/>
+      </p:nvGrpSpPr>
+      <p:grpSpPr>
+        <a:xfrm>
+          <a:off x="0" y="0"/>
+          <a:ext cx="0" cy="0"/>
+          <a:chOff x="0" y="0"/>
+          <a:chExt cx="0" cy="0"/>
+        </a:xfrm>
+      </p:grpSpPr>
+      <p:sp>
+        <p:nvSpPr>
+          <p:cNvPr id="2" name="Title 1"/>
+          <p:cNvSpPr>
+            <a:spLocks noGrp="1"/>
+          </p:cNvSpPr>
+          <p:nvPr>
+            <p:ph type="title"/>
+          </p:nvPr>
+        </p:nvSpPr>
+        <p:spPr>
+          <a:xfrm>
+            <a:off x="457200" y="449932"/>
+            <a:ext cx="8286750" cy="1150353"/>
+          </a:xfrm>
+        </p:spPr>
+        <p:txBody>
+          <a:bodyPr>
+            <a:normAutofit/>
+          </a:bodyPr>
+          <a:lstStyle/>
+          <a:p>
+            <a:r>
+              <a:rPr lang="en-CA" dirty="0" smtClean="0">
+                <a:latin typeface="+mn-lt"/>
+              </a:rPr>
+              <a:t>Some Where Predicates</a:t>
+            </a:r>
+            <a:endParaRPr lang="en-CA" dirty="0">
+              <a:latin typeface="+mn-lt"/>
+            </a:endParaRPr>
+          </a:p>
+        </p:txBody>
+      </p:sp>
+      <p:graphicFrame>
+        <p:nvGraphicFramePr>
+          <p:cNvPr id="5" name="Content Placeholder 4"/>
+          <p:cNvGraphicFramePr>
+            <a:graphicFrameLocks noGrp="1"/>
+          </p:cNvGraphicFramePr>
+          <p:nvPr>
+            <p:ph idx="1"/>
+            <p:extLst>
+              <p:ext uri="{D42A27DB-BD31-4B8C-83A1-F6EECF244321}">
+                <p14:modId xmlns:p14="http://schemas.microsoft.com/office/powerpoint/2010/main" val="2802590742"/>
+              </p:ext>
+            </p:extLst>
+          </p:nvPr>
+        </p:nvGraphicFramePr>
+        <p:xfrm>
+          <a:off x="539750" y="1419310"/>
+          <a:ext cx="7947025" cy="4181388"/>
+        </p:xfrm>
+        <a:graphic>
+          <a:graphicData uri="http://schemas.openxmlformats.org/drawingml/2006/table">
+            <a:tbl>
+              <a:tblPr firstRow="1" bandRow="1">
+                <a:tableStyleId>{5C22544A-7EE6-4342-B048-85BDC9FD1C3A}</a:tableStyleId>
+              </a:tblPr>
+              <a:tblGrid>
+                <a:gridCol w="2555875"/>
+                <a:gridCol w="2552700"/>
+                <a:gridCol w="2838450"/>
+              </a:tblGrid>
+              <a:tr h="432353">
+                <a:tc>
+                  <a:txBody>
+                    <a:bodyPr/>
+                    <a:lstStyle/>
+                    <a:p>
+                      <a:pPr algn="ctr" fontAlgn="ctr"/>
+                      <a:r>
+                        <a:rPr lang="en-CA" sz="1600" b="1" i="0" u="none" strike="noStrike" dirty="0">
+                          <a:solidFill>
+                            <a:schemeClr val="bg1"/>
+                          </a:solidFill>
+                          <a:effectLst/>
+                          <a:latin typeface="+mn-lt"/>
+                        </a:rPr>
+                        <a:t>Predicate</a:t>
+                      </a:r>
+                    </a:p>
+                  </a:txBody>
+                  <a:tcPr marL="7620" marR="7620" marT="7620" marB="0" anchor="ctr"/>
+                </a:tc>
+                <a:tc>
+                  <a:txBody>
+                    <a:bodyPr/>
+                    <a:lstStyle/>
+                    <a:p>
+                      <a:pPr algn="ctr" fontAlgn="ctr"/>
+                      <a:r>
+                        <a:rPr lang="en-CA" sz="1600" b="1" i="0" u="none" strike="noStrike">
+                          <a:solidFill>
+                            <a:schemeClr val="bg1"/>
+                          </a:solidFill>
+                          <a:effectLst/>
+                          <a:latin typeface="+mn-lt"/>
+                        </a:rPr>
+                        <a:t>Result</a:t>
+                      </a:r>
+                    </a:p>
+                  </a:txBody>
+                  <a:tcPr marL="7620" marR="7620" marT="7620" marB="0" anchor="ctr"/>
+                </a:tc>
+                <a:tc>
+                  <a:txBody>
+                    <a:bodyPr/>
+                    <a:lstStyle/>
+                    <a:p>
+                      <a:pPr algn="ctr" fontAlgn="ctr"/>
+                      <a:r>
+                        <a:rPr lang="en-CA" sz="1600" b="1" i="0" u="none" strike="noStrike" dirty="0">
+                          <a:solidFill>
+                            <a:schemeClr val="bg1"/>
+                          </a:solidFill>
+                          <a:effectLst/>
+                          <a:latin typeface="+mn-lt"/>
+                        </a:rPr>
+                        <a:t>Example</a:t>
+                      </a:r>
+                    </a:p>
+                  </a:txBody>
+                  <a:tcPr marL="7620" marR="7620" marT="7620" marB="0" anchor="ctr"/>
+                </a:tc>
+              </a:tr>
+              <a:tr h="577458">
+                <a:tc>
+                  <a:txBody>
+                    <a:bodyPr/>
+                    <a:lstStyle/>
+                    <a:p>
+                      <a:pPr algn="ctr" fontAlgn="ctr"/>
+                      <a:r>
+                        <a:rPr lang="en-CA" sz="1600" b="0" i="0" u="none" strike="noStrike">
+                          <a:solidFill>
+                            <a:srgbClr val="000000"/>
+                          </a:solidFill>
+                          <a:effectLst/>
+                          <a:latin typeface="+mn-lt"/>
+                        </a:rPr>
+                        <a:t>are.equal_to</a:t>
+                      </a:r>
+                    </a:p>
+                  </a:txBody>
+                  <a:tcPr marL="7620" marR="7620" marT="7620" marB="0" anchor="ctr"/>
+                </a:tc>
+                <a:tc>
+                  <a:txBody>
+                    <a:bodyPr/>
+                    <a:lstStyle/>
+                    <a:p>
+                      <a:pPr algn="ctr" fontAlgn="ctr"/>
+                      <a:r>
+                        <a:rPr lang="en-CA" sz="1600" b="0" i="0" u="none" strike="noStrike">
+                          <a:solidFill>
+                            <a:srgbClr val="000000"/>
+                          </a:solidFill>
+                          <a:effectLst/>
+                          <a:latin typeface="+mn-lt"/>
+                        </a:rPr>
+                        <a:t>Find rows with values equal to 50</a:t>
+                      </a:r>
+                    </a:p>
+                  </a:txBody>
+                  <a:tcPr marL="7620" marR="7620" marT="7620" marB="0" anchor="ctr"/>
+                </a:tc>
+                <a:tc>
+                  <a:txBody>
+                    <a:bodyPr/>
+                    <a:lstStyle/>
+                    <a:p>
+                      <a:pPr algn="ctr" fontAlgn="ctr"/>
+                      <a:r>
+                        <a:rPr lang="en-CA" sz="1600" b="0" i="0" u="none" strike="noStrike">
+                          <a:solidFill>
+                            <a:srgbClr val="000000"/>
+                          </a:solidFill>
+                          <a:effectLst/>
+                          <a:latin typeface="+mn-lt"/>
+                        </a:rPr>
+                        <a:t>are.equal_to(50)</a:t>
+                      </a:r>
+                    </a:p>
+                  </a:txBody>
+                  <a:tcPr marL="7620" marR="7620" marT="7620" marB="0" anchor="ctr"/>
+                </a:tc>
+              </a:tr>
+              <a:tr h="577458">
+                <a:tc>
+                  <a:txBody>
+                    <a:bodyPr/>
+                    <a:lstStyle/>
+                    <a:p>
+                      <a:pPr algn="ctr" fontAlgn="ctr"/>
+                      <a:r>
+                        <a:rPr lang="en-CA" sz="1600" b="0" i="0" u="none" strike="noStrike">
+                          <a:solidFill>
+                            <a:srgbClr val="000000"/>
+                          </a:solidFill>
+                          <a:effectLst/>
+                          <a:latin typeface="+mn-lt"/>
+                        </a:rPr>
+                        <a:t>are.not_equal_to</a:t>
+                      </a:r>
+                    </a:p>
+                  </a:txBody>
+                  <a:tcPr marL="7620" marR="7620" marT="7620" marB="0" anchor="ctr"/>
+                </a:tc>
+                <a:tc>
+                  <a:txBody>
+                    <a:bodyPr/>
+                    <a:lstStyle/>
+                    <a:p>
+                      <a:pPr algn="ctr" fontAlgn="ctr"/>
+                      <a:r>
+                        <a:rPr lang="en-CA" sz="1600" b="0" i="0" u="none" strike="noStrike" dirty="0">
+                          <a:solidFill>
+                            <a:srgbClr val="000000"/>
+                          </a:solidFill>
+                          <a:effectLst/>
+                          <a:latin typeface="+mn-lt"/>
+                        </a:rPr>
+                        <a:t>Find rows with values not equal to 50</a:t>
+                      </a:r>
+                    </a:p>
+                  </a:txBody>
+                  <a:tcPr marL="7620" marR="7620" marT="7620" marB="0" anchor="ctr"/>
+                </a:tc>
+                <a:tc>
+                  <a:txBody>
+                    <a:bodyPr/>
+                    <a:lstStyle/>
+                    <a:p>
+                      <a:pPr algn="ctr" fontAlgn="ctr"/>
+                      <a:r>
+                        <a:rPr lang="en-CA" sz="1600" b="0" i="0" u="none" strike="noStrike">
+                          <a:solidFill>
+                            <a:srgbClr val="000000"/>
+                          </a:solidFill>
+                          <a:effectLst/>
+                          <a:latin typeface="+mn-lt"/>
+                        </a:rPr>
+                        <a:t>are.not_equal_to(50)</a:t>
+                      </a:r>
+                    </a:p>
+                  </a:txBody>
+                  <a:tcPr marL="7620" marR="7620" marT="7620" marB="0" anchor="ctr"/>
+                </a:tc>
+              </a:tr>
+              <a:tr h="577458">
+                <a:tc>
+                  <a:txBody>
+                    <a:bodyPr/>
+                    <a:lstStyle/>
+                    <a:p>
+                      <a:pPr algn="ctr" fontAlgn="ctr"/>
+                      <a:r>
+                        <a:rPr lang="en-CA" sz="1600" b="0" i="0" u="none" strike="noStrike" dirty="0" err="1">
+                          <a:solidFill>
+                            <a:srgbClr val="000000"/>
+                          </a:solidFill>
+                          <a:effectLst/>
+                          <a:latin typeface="+mn-lt"/>
+                        </a:rPr>
+                        <a:t>are.above</a:t>
+                      </a:r>
+                      <a:endParaRPr lang="en-CA" sz="1600" b="0" i="0" u="none" strike="noStrike" dirty="0">
+                        <a:solidFill>
+                          <a:srgbClr val="000000"/>
+                        </a:solidFill>
+                        <a:effectLst/>
+                        <a:latin typeface="+mn-lt"/>
+                      </a:endParaRPr>
+                    </a:p>
+                  </a:txBody>
+                  <a:tcPr marL="7620" marR="7620" marT="7620" marB="0" anchor="ctr"/>
+                </a:tc>
+                <a:tc>
+                  <a:txBody>
+                    <a:bodyPr/>
+                    <a:lstStyle/>
+                    <a:p>
+                      <a:pPr algn="ctr" fontAlgn="ctr"/>
+                      <a:r>
+                        <a:rPr lang="en-CA" sz="1600" b="0" i="0" u="none" strike="noStrike" dirty="0">
+                          <a:solidFill>
+                            <a:srgbClr val="000000"/>
+                          </a:solidFill>
+                          <a:effectLst/>
+                          <a:latin typeface="+mn-lt"/>
+                        </a:rPr>
+                        <a:t>Find rows with values above (and not equal to) 50</a:t>
+                      </a:r>
+                    </a:p>
+                  </a:txBody>
+                  <a:tcPr marL="7620" marR="7620" marT="7620" marB="0" anchor="ctr"/>
+                </a:tc>
+                <a:tc>
+                  <a:txBody>
+                    <a:bodyPr/>
+                    <a:lstStyle/>
+                    <a:p>
+                      <a:pPr algn="ctr" fontAlgn="ctr"/>
+                      <a:r>
+                        <a:rPr lang="en-CA" sz="1600" b="0" i="0" u="none" strike="noStrike">
+                          <a:solidFill>
+                            <a:srgbClr val="000000"/>
+                          </a:solidFill>
+                          <a:effectLst/>
+                          <a:latin typeface="+mn-lt"/>
+                        </a:rPr>
+                        <a:t>are.above(50)</a:t>
+                      </a:r>
+                    </a:p>
+                  </a:txBody>
+                  <a:tcPr marL="7620" marR="7620" marT="7620" marB="0" anchor="ctr"/>
+                </a:tc>
+              </a:tr>
+              <a:tr h="577458">
+                <a:tc>
+                  <a:txBody>
+                    <a:bodyPr/>
+                    <a:lstStyle/>
+                    <a:p>
+                      <a:pPr algn="ctr" fontAlgn="ctr"/>
+                      <a:r>
+                        <a:rPr lang="en-CA" sz="1600" b="0" i="0" u="none" strike="noStrike">
+                          <a:solidFill>
+                            <a:srgbClr val="000000"/>
+                          </a:solidFill>
+                          <a:effectLst/>
+                          <a:latin typeface="+mn-lt"/>
+                        </a:rPr>
+                        <a:t>are.above_or_equal_to</a:t>
+                      </a:r>
+                    </a:p>
+                  </a:txBody>
+                  <a:tcPr marL="7620" marR="7620" marT="7620" marB="0" anchor="ctr"/>
+                </a:tc>
+                <a:tc>
+                  <a:txBody>
+                    <a:bodyPr/>
+                    <a:lstStyle/>
+                    <a:p>
+                      <a:pPr algn="ctr" fontAlgn="ctr"/>
+                      <a:r>
+                        <a:rPr lang="en-CA" sz="1600" b="0" i="0" u="none" strike="noStrike">
+                          <a:solidFill>
+                            <a:srgbClr val="000000"/>
+                          </a:solidFill>
+                          <a:effectLst/>
+                          <a:latin typeface="+mn-lt"/>
+                        </a:rPr>
+                        <a:t>Find rows with values above 50 or equal to 50</a:t>
+                      </a:r>
+                    </a:p>
+                  </a:txBody>
+                  <a:tcPr marL="7620" marR="7620" marT="7620" marB="0" anchor="ctr"/>
+                </a:tc>
+                <a:tc>
+                  <a:txBody>
+                    <a:bodyPr/>
+                    <a:lstStyle/>
+                    <a:p>
+                      <a:pPr algn="ctr" fontAlgn="ctr"/>
+                      <a:r>
+                        <a:rPr lang="en-CA" sz="1600" b="0" i="0" u="none" strike="noStrike">
+                          <a:solidFill>
+                            <a:srgbClr val="000000"/>
+                          </a:solidFill>
+                          <a:effectLst/>
+                          <a:latin typeface="+mn-lt"/>
+                        </a:rPr>
+                        <a:t>are.above_or_equal_to(50)</a:t>
+                      </a:r>
+                    </a:p>
+                  </a:txBody>
+                  <a:tcPr marL="7620" marR="7620" marT="7620" marB="0" anchor="ctr"/>
+                </a:tc>
+              </a:tr>
+              <a:tr h="577458">
+                <a:tc>
+                  <a:txBody>
+                    <a:bodyPr/>
+                    <a:lstStyle/>
+                    <a:p>
+                      <a:pPr algn="ctr" fontAlgn="ctr"/>
+                      <a:r>
+                        <a:rPr lang="en-CA" sz="1600" b="0" i="0" u="none" strike="noStrike">
+                          <a:solidFill>
+                            <a:srgbClr val="000000"/>
+                          </a:solidFill>
+                          <a:effectLst/>
+                          <a:latin typeface="+mn-lt"/>
+                        </a:rPr>
+                        <a:t>are.below</a:t>
+                      </a:r>
+                    </a:p>
+                  </a:txBody>
+                  <a:tcPr marL="7620" marR="7620" marT="7620" marB="0" anchor="ctr"/>
+                </a:tc>
+                <a:tc>
+                  <a:txBody>
+                    <a:bodyPr/>
+                    <a:lstStyle/>
+                    <a:p>
+                      <a:pPr algn="ctr" fontAlgn="ctr"/>
+                      <a:r>
+                        <a:rPr lang="en-CA" sz="1600" b="0" i="0" u="none" strike="noStrike">
+                          <a:solidFill>
+                            <a:srgbClr val="000000"/>
+                          </a:solidFill>
+                          <a:effectLst/>
+                          <a:latin typeface="+mn-lt"/>
+                        </a:rPr>
+                        <a:t>Find rows with values below 50</a:t>
+                      </a:r>
+                    </a:p>
+                  </a:txBody>
+                  <a:tcPr marL="7620" marR="7620" marT="7620" marB="0" anchor="ctr"/>
+                </a:tc>
+                <a:tc>
+                  <a:txBody>
+                    <a:bodyPr/>
+                    <a:lstStyle/>
+                    <a:p>
+                      <a:pPr algn="ctr" fontAlgn="ctr"/>
+                      <a:r>
+                        <a:rPr lang="en-CA" sz="1600" b="0" i="0" u="none" strike="noStrike">
+                          <a:solidFill>
+                            <a:srgbClr val="000000"/>
+                          </a:solidFill>
+                          <a:effectLst/>
+                          <a:latin typeface="+mn-lt"/>
+                        </a:rPr>
+                        <a:t>are.below(50)</a:t>
+                      </a:r>
+                    </a:p>
+                  </a:txBody>
+                  <a:tcPr marL="7620" marR="7620" marT="7620" marB="0" anchor="ctr"/>
+                </a:tc>
+              </a:tr>
+              <a:tr h="861745">
+                <a:tc>
+                  <a:txBody>
+                    <a:bodyPr/>
+                    <a:lstStyle/>
+                    <a:p>
+                      <a:pPr algn="ctr" fontAlgn="ctr"/>
+                      <a:r>
+                        <a:rPr lang="en-CA" sz="1600" b="0" i="0" u="none" strike="noStrike">
+                          <a:solidFill>
+                            <a:srgbClr val="000000"/>
+                          </a:solidFill>
+                          <a:effectLst/>
+                          <a:latin typeface="+mn-lt"/>
+                        </a:rPr>
+                        <a:t>are.between</a:t>
+                      </a:r>
+                    </a:p>
+                  </a:txBody>
+                  <a:tcPr marL="7620" marR="7620" marT="7620" marB="0" anchor="ctr"/>
+                </a:tc>
+                <a:tc>
+                  <a:txBody>
+                    <a:bodyPr/>
+                    <a:lstStyle/>
+                    <a:p>
+                      <a:pPr algn="ctr" fontAlgn="ctr"/>
+                      <a:r>
+                        <a:rPr lang="en-CA" sz="1600" b="0" i="0" u="none" strike="noStrike">
+                          <a:solidFill>
+                            <a:srgbClr val="000000"/>
+                          </a:solidFill>
+                          <a:effectLst/>
+                          <a:latin typeface="+mn-lt"/>
+                        </a:rPr>
+                        <a:t>Find rows with values above or equal to 2 and below 10</a:t>
+                      </a:r>
+                    </a:p>
+                  </a:txBody>
+                  <a:tcPr marL="7620" marR="7620" marT="7620" marB="0" anchor="ctr"/>
+                </a:tc>
+                <a:tc>
+                  <a:txBody>
+                    <a:bodyPr/>
+                    <a:lstStyle/>
+                    <a:p>
+                      <a:pPr algn="ctr" fontAlgn="ctr"/>
+                      <a:r>
+                        <a:rPr lang="en-CA" sz="1600" b="0" i="0" u="none" strike="noStrike" dirty="0" err="1">
+                          <a:solidFill>
+                            <a:srgbClr val="000000"/>
+                          </a:solidFill>
+                          <a:effectLst/>
+                          <a:latin typeface="+mn-lt"/>
+                        </a:rPr>
+                        <a:t>are.between</a:t>
+                      </a:r>
+                      <a:r>
+                        <a:rPr lang="en-CA" sz="1600" b="0" i="0" u="none" strike="noStrike" dirty="0">
+                          <a:solidFill>
+                            <a:srgbClr val="000000"/>
+                          </a:solidFill>
+                          <a:effectLst/>
+                          <a:latin typeface="+mn-lt"/>
+                        </a:rPr>
+                        <a:t>(2, 10)</a:t>
+                      </a:r>
+                    </a:p>
+                  </a:txBody>
+                  <a:tcPr marL="7620" marR="7620" marT="7620" marB="0" anchor="ctr"/>
+                </a:tc>
+              </a:tr>
+            </a:tbl>
+          </a:graphicData>
+        </a:graphic>
+      </p:graphicFrame>
+    </p:spTree>
+    <p:extLst>
+      <p:ext uri="{BB962C8B-B14F-4D97-AF65-F5344CB8AC3E}">
+        <p14:creationId xmlns:p14="http://schemas.microsoft.com/office/powerpoint/2010/main" val="153421900"/>
+      </p:ext>
+    </p:extLst>
+  </p:cSld>
+  <p:clrMapOvr>
+    <a:masterClrMapping/>
+  </p:clrMapOvr>
+  <p:timing>
+    <p:tnLst>
+      <p:par>
+        <p:cTn id="1" dur="indefinite" restart="never" nodeType="tmRoot"/>
+      </p:par>
+    </p:tnLst>
+  </p:timing>
+</p:sld>
+</file>
+
+<file path=ppt/slides/slide23.xml><?xml version="1.0" encoding="utf-8"?>
+<p:sld xmlns:a="http://schemas.openxmlformats.org/drawingml/2006/main" xmlns:r="http://schemas.openxmlformats.org/officeDocument/2006/relationships" xmlns:p="http://schemas.openxmlformats.org/presentationml/2006/main">
+  <p:cSld>
+    <p:spTree>
+      <p:nvGrpSpPr>
+        <p:cNvPr id="1" name=""/>
+        <p:cNvGrpSpPr/>
+        <p:nvPr/>
+      </p:nvGrpSpPr>
+      <p:grpSpPr>
+        <a:xfrm>
+          <a:off x="0" y="0"/>
+          <a:ext cx="0" cy="0"/>
+          <a:chOff x="0" y="0"/>
+          <a:chExt cx="0" cy="0"/>
+        </a:xfrm>
+      </p:grpSpPr>
+      <p:sp>
+        <p:nvSpPr>
+          <p:cNvPr id="2" name="Title 1"/>
+          <p:cNvSpPr>
+            <a:spLocks noGrp="1"/>
+          </p:cNvSpPr>
+          <p:nvPr>
+            <p:ph type="title"/>
+          </p:nvPr>
+        </p:nvSpPr>
+        <p:spPr>
+          <a:xfrm>
+            <a:off x="457200" y="449932"/>
+            <a:ext cx="8286750" cy="1150353"/>
+          </a:xfrm>
+        </p:spPr>
+        <p:txBody>
+          <a:bodyPr>
+            <a:normAutofit/>
+          </a:bodyPr>
+          <a:lstStyle/>
+          <a:p>
+            <a:r>
+              <a:rPr lang="en-CA" dirty="0" smtClean="0">
+                <a:latin typeface="+mn-lt"/>
+              </a:rPr>
+              <a:t>Tables: Demo</a:t>
+            </a:r>
+            <a:endParaRPr lang="en-CA" dirty="0">
+              <a:latin typeface="+mn-lt"/>
+            </a:endParaRPr>
+          </a:p>
+        </p:txBody>
+      </p:sp>
+      <p:sp>
+        <p:nvSpPr>
+          <p:cNvPr id="4" name="AutoShape 2" descr="https://datahub.berkeley.edu/user/hubertluo/files/materials-sp19/materials/sp19/lab/lab02/statement.png"/>
+          <p:cNvSpPr>
+            <a:spLocks noChangeAspect="1" noChangeArrowheads="1"/>
+          </p:cNvSpPr>
+          <p:nvPr/>
+        </p:nvSpPr>
+        <p:spPr bwMode="auto">
+          <a:xfrm>
+            <a:off x="155575" y="-144463"/>
+            <a:ext cx="304800" cy="304801"/>
+          </a:xfrm>
+          <a:prstGeom prst="rect">
+            <a:avLst/>
+          </a:prstGeom>
+          <a:noFill/>
+          <a:extLst>
+            <a:ext uri="{909E8E84-426E-40DD-AFC4-6F175D3DCCD1}">
+              <a14:hiddenFill xmlns:a14="http://schemas.microsoft.com/office/drawing/2010/main">
+                <a:solidFill>
+                  <a:srgbClr val="FFFFFF"/>
+                </a:solidFill>
+              </a14:hiddenFill>
+            </a:ext>
+          </a:extLst>
+        </p:spPr>
+        <p:txBody>
+          <a:bodyPr vert="horz" wrap="square" lIns="91440" tIns="45720" rIns="91440" bIns="45720" numCol="1" anchor="t" anchorCtr="0" compatLnSpc="1">
+            <a:prstTxWarp prst="textNoShape">
+              <a:avLst/>
+            </a:prstTxWarp>
+          </a:bodyPr>
+          <a:lstStyle/>
+          <a:p>
+            <a:endParaRPr lang="en-CA"/>
+          </a:p>
+        </p:txBody>
+      </p:sp>
+      <p:sp>
+        <p:nvSpPr>
+          <p:cNvPr id="3" name="Content Placeholder 2"/>
+          <p:cNvSpPr>
+            <a:spLocks noGrp="1"/>
+          </p:cNvSpPr>
+          <p:nvPr>
+            <p:ph idx="1"/>
+          </p:nvPr>
+        </p:nvSpPr>
+        <p:spPr/>
+        <p:txBody>
+          <a:bodyPr/>
+          <a:lstStyle/>
+          <a:p>
+            <a:r>
+              <a:rPr lang="en-CA" dirty="0" smtClean="0"/>
+              <a:t>(Demo on Notebook)</a:t>
+            </a:r>
+            <a:endParaRPr lang="en-CA" dirty="0"/>
+          </a:p>
+        </p:txBody>
+      </p:sp>
+    </p:spTree>
+    <p:extLst>
+      <p:ext uri="{BB962C8B-B14F-4D97-AF65-F5344CB8AC3E}">
+        <p14:creationId xmlns:p14="http://schemas.microsoft.com/office/powerpoint/2010/main" val="3311256157"/>
+      </p:ext>
+    </p:extLst>
+  </p:cSld>
+  <p:clrMapOvr>
+    <a:masterClrMapping/>
+  </p:clrMapOvr>
+  <p:timing>
+    <p:tnLst>
+      <p:par>
+        <p:cTn id="1" dur="indefinite" restart="never" nodeType="tmRoot"/>
+      </p:par>
+    </p:tnLst>
+  </p:timing>
+</p:sld>
+</file>
+
+<file path=ppt/slides/slide24.xml><?xml version="1.0" encoding="utf-8"?>
+<p:sld xmlns:a="http://schemas.openxmlformats.org/drawingml/2006/main" xmlns:r="http://schemas.openxmlformats.org/officeDocument/2006/relationships" xmlns:p="http://schemas.openxmlformats.org/presentationml/2006/main">
+  <p:cSld>
+    <p:spTree>
+      <p:nvGrpSpPr>
+        <p:cNvPr id="1" name=""/>
+        <p:cNvGrpSpPr/>
+        <p:nvPr/>
+      </p:nvGrpSpPr>
+      <p:grpSpPr>
+        <a:xfrm>
+          <a:off x="0" y="0"/>
+          <a:ext cx="0" cy="0"/>
+          <a:chOff x="0" y="0"/>
+          <a:chExt cx="0" cy="0"/>
+        </a:xfrm>
+      </p:grpSpPr>
+      <p:sp>
+        <p:nvSpPr>
+          <p:cNvPr id="2" name="Title 1"/>
+          <p:cNvSpPr>
+            <a:spLocks noGrp="1"/>
+          </p:cNvSpPr>
+          <p:nvPr>
+            <p:ph type="title"/>
+          </p:nvPr>
+        </p:nvSpPr>
+        <p:spPr>
+          <a:xfrm>
+            <a:off x="457200" y="449932"/>
+            <a:ext cx="8286750" cy="1150353"/>
+          </a:xfrm>
+        </p:spPr>
+        <p:txBody>
+          <a:bodyPr/>
+          <a:lstStyle/>
+          <a:p>
+            <a:r>
+              <a:rPr lang="en-CA" dirty="0" smtClean="0">
+                <a:latin typeface="+mn-lt"/>
+              </a:rPr>
+              <a:t>Announcements</a:t>
+            </a:r>
+            <a:endParaRPr lang="en-CA" dirty="0">
+              <a:latin typeface="+mn-lt"/>
+            </a:endParaRPr>
+          </a:p>
+        </p:txBody>
+      </p:sp>
+      <p:sp>
+        <p:nvSpPr>
+          <p:cNvPr id="3" name="Content Placeholder 2"/>
+          <p:cNvSpPr>
+            <a:spLocks noGrp="1"/>
+          </p:cNvSpPr>
+          <p:nvPr>
+            <p:ph idx="1"/>
+          </p:nvPr>
+        </p:nvSpPr>
+        <p:spPr>
+          <a:xfrm>
+            <a:off x="457200" y="1756947"/>
+            <a:ext cx="8286750" cy="3596103"/>
+          </a:xfrm>
+        </p:spPr>
+        <p:txBody>
+          <a:bodyPr/>
+          <a:lstStyle/>
+          <a:p>
+            <a:r>
+              <a:rPr lang="en-CA" dirty="0" smtClean="0">
+                <a:latin typeface="Avenir LT Std 45 Book" pitchFamily="34" charset="0"/>
+              </a:rPr>
+              <a:t>HW2 due Thursday 9/12</a:t>
+            </a:r>
+          </a:p>
+          <a:p>
+            <a:r>
+              <a:rPr lang="en-CA" dirty="0" smtClean="0">
+                <a:latin typeface="Avenir LT Std 45 Book" pitchFamily="34" charset="0"/>
+              </a:rPr>
+              <a:t>Tutoring section sign-ups will be released soon</a:t>
+            </a:r>
+          </a:p>
+          <a:p>
+            <a:pPr lvl="1"/>
+            <a:r>
+              <a:rPr lang="en-CA" dirty="0" smtClean="0">
+                <a:latin typeface="Avenir LT Std 45 Book" pitchFamily="34" charset="0"/>
+              </a:rPr>
+              <a:t>Work with a tutor and other students in a small group setting</a:t>
+            </a:r>
+          </a:p>
+          <a:p>
+            <a:endParaRPr lang="en-CA" dirty="0">
+              <a:latin typeface="Avenir LT Std 45 Book" pitchFamily="34" charset="0"/>
+            </a:endParaRPr>
+          </a:p>
+        </p:txBody>
+      </p:sp>
+    </p:spTree>
+    <p:extLst>
+      <p:ext uri="{BB962C8B-B14F-4D97-AF65-F5344CB8AC3E}">
+        <p14:creationId xmlns:p14="http://schemas.microsoft.com/office/powerpoint/2010/main" val="203414778"/>
+      </p:ext>
+    </p:extLst>
+  </p:cSld>
+  <p:clrMapOvr>
+    <a:masterClrMapping/>
+  </p:clrMapOvr>
+  <p:timing>
+    <p:tnLst>
+      <p:par>
+        <p:cTn id="1" dur="indefinite" restart="never" nodeType="tmRoot"/>
+      </p:par>
+    </p:tnLst>
+  </p:timing>
+</p:sld>
+</file>
+
+<file path=ppt/slides/slide25.xml><?xml version="1.0" encoding="utf-8"?>
+<p:sld xmlns:a="http://schemas.openxmlformats.org/drawingml/2006/main" xmlns:r="http://schemas.openxmlformats.org/officeDocument/2006/relationships" xmlns:p="http://schemas.openxmlformats.org/presentationml/2006/main">
+  <p:cSld>
+    <p:spTree>
+      <p:nvGrpSpPr>
+        <p:cNvPr id="1" name=""/>
+        <p:cNvGrpSpPr/>
+        <p:nvPr/>
+      </p:nvGrpSpPr>
+      <p:grpSpPr>
+        <a:xfrm>
+          <a:off x="0" y="0"/>
+          <a:ext cx="0" cy="0"/>
+          <a:chOff x="0" y="0"/>
+          <a:chExt cx="0" cy="0"/>
+        </a:xfrm>
+      </p:grpSpPr>
+      <p:sp>
+        <p:nvSpPr>
+          <p:cNvPr id="2" name="Title 1"/>
+          <p:cNvSpPr>
+            <a:spLocks noGrp="1"/>
+          </p:cNvSpPr>
+          <p:nvPr>
+            <p:ph type="title"/>
+          </p:nvPr>
+        </p:nvSpPr>
+        <p:spPr>
+          <a:xfrm>
+            <a:off x="457200" y="449932"/>
+            <a:ext cx="8286750" cy="1150353"/>
+          </a:xfrm>
+        </p:spPr>
+        <p:txBody>
+          <a:bodyPr/>
+          <a:lstStyle/>
+          <a:p>
+            <a:r>
+              <a:rPr lang="en-CA" dirty="0" smtClean="0">
+                <a:latin typeface="+mn-lt"/>
+              </a:rPr>
+              <a:t>Lab Notebook</a:t>
+            </a:r>
+            <a:endParaRPr lang="en-CA" dirty="0">
+              <a:latin typeface="+mn-lt"/>
+            </a:endParaRPr>
+          </a:p>
+        </p:txBody>
+      </p:sp>
+      <p:sp>
+        <p:nvSpPr>
+          <p:cNvPr id="3" name="Content Placeholder 2"/>
+          <p:cNvSpPr>
+            <a:spLocks noGrp="1"/>
+          </p:cNvSpPr>
+          <p:nvPr>
+            <p:ph idx="1"/>
+          </p:nvPr>
+        </p:nvSpPr>
+        <p:spPr>
+          <a:xfrm>
+            <a:off x="457200" y="1756947"/>
+            <a:ext cx="8286750" cy="3596103"/>
+          </a:xfrm>
+        </p:spPr>
+        <p:txBody>
+          <a:bodyPr/>
+          <a:lstStyle/>
+          <a:p>
+            <a:pPr marL="0" indent="0">
+              <a:buNone/>
+            </a:pPr>
+            <a:r>
+              <a:rPr lang="en-CA" smtClean="0">
+                <a:latin typeface="Avenir LT Std 45 Book" pitchFamily="34" charset="0"/>
+              </a:rPr>
+              <a:t>TBD</a:t>
+            </a:r>
+          </a:p>
+        </p:txBody>
+      </p:sp>
+    </p:spTree>
+    <p:extLst>
+      <p:ext uri="{BB962C8B-B14F-4D97-AF65-F5344CB8AC3E}">
+        <p14:creationId xmlns:p14="http://schemas.microsoft.com/office/powerpoint/2010/main" val="687167673"/>
       </p:ext>
     </p:extLst>
   </p:cSld>
@@ -8935,67 +12154,26 @@
         <p:spPr>
           <a:xfrm>
             <a:off x="457200" y="1756947"/>
-            <a:ext cx="8286750" cy="3919953"/>
+            <a:ext cx="8286750" cy="3596103"/>
           </a:xfrm>
         </p:spPr>
         <p:txBody>
-          <a:bodyPr>
-            <a:normAutofit lnSpcReduction="10000"/>
-          </a:bodyPr>
+          <a:bodyPr/>
           <a:lstStyle/>
           <a:p>
             <a:r>
               <a:rPr lang="en-CA" dirty="0" smtClean="0">
                 <a:latin typeface="Avenir LT Std 45 Book" pitchFamily="34" charset="0"/>
               </a:rPr>
-              <a:t>Association: Any relationship between the treatment and outcome (aka there is a </a:t>
-            </a:r>
-            <a:r>
-              <a:rPr lang="en-CA" b="1" dirty="0" smtClean="0">
-                <a:latin typeface="Avenir LT Std 45 Book" pitchFamily="34" charset="0"/>
-              </a:rPr>
-              <a:t>correlation</a:t>
-            </a:r>
+              <a:t>Treatment: Factor of interest </a:t>
+            </a:r>
+          </a:p>
+          <a:p>
             <a:r>
               <a:rPr lang="en-CA" dirty="0" smtClean="0">
                 <a:latin typeface="Avenir LT Std 45 Book" pitchFamily="34" charset="0"/>
               </a:rPr>
-              <a:t> between them)</a:t>
-            </a:r>
-          </a:p>
-          <a:p>
-            <a:r>
-              <a:rPr lang="en-CA" dirty="0" smtClean="0">
-                <a:latin typeface="Avenir LT Std 45 Book" pitchFamily="34" charset="0"/>
-              </a:rPr>
-              <a:t>Causation: The treatment </a:t>
-            </a:r>
-            <a:r>
-              <a:rPr lang="en-CA" i="1" dirty="0" smtClean="0">
-                <a:latin typeface="Avenir LT Std 45 Book" pitchFamily="34" charset="0"/>
-              </a:rPr>
-              <a:t>causes</a:t>
-            </a:r>
-            <a:r>
-              <a:rPr lang="en-CA" dirty="0" smtClean="0">
-                <a:latin typeface="Avenir LT Std 45 Book" pitchFamily="34" charset="0"/>
-              </a:rPr>
-              <a:t> the outcome</a:t>
-            </a:r>
-          </a:p>
-          <a:p>
-            <a:pPr lvl="1"/>
-            <a:r>
-              <a:rPr lang="en-CA" b="1" dirty="0" smtClean="0">
-                <a:latin typeface="Avenir LT Std 45 Book" pitchFamily="34" charset="0"/>
-              </a:rPr>
-              <a:t>Correlation does not imply causation!!!!</a:t>
-            </a:r>
-            <a:r>
-              <a:rPr lang="en-CA" dirty="0" smtClean="0">
-                <a:latin typeface="Avenir LT Std 45 Book" pitchFamily="34" charset="0"/>
-              </a:rPr>
-              <a:t>	</a:t>
+              <a:t>Outcome: What is being measured</a:t>
             </a:r>
           </a:p>
           <a:p>
@@ -9020,16 +12198,28 @@
               <a:rPr lang="en-CA" dirty="0" smtClean="0">
                 <a:latin typeface="Avenir LT Std 45 Book" pitchFamily="34" charset="0"/>
               </a:rPr>
-              <a:t>Association: Most states who have capital punishment also have high murder rate</a:t>
-            </a:r>
-          </a:p>
-          <a:p>
-            <a:pPr lvl="1"/>
+              <a:t>Treatment: </a:t>
+            </a:r>
+            <a:r>
+              <a:rPr lang="en-CA" dirty="0">
+                <a:latin typeface="Avenir LT Std 45 Book" pitchFamily="34" charset="0"/>
+              </a:rPr>
+              <a:t>Whether a state has capital </a:t>
+            </a:r>
             <a:r>
               <a:rPr lang="en-CA" dirty="0" smtClean="0">
                 <a:latin typeface="Avenir LT Std 45 Book" pitchFamily="34" charset="0"/>
               </a:rPr>
-              <a:t>Outcome: Having capital punishment causes states to have murder rate</a:t>
+              <a:t>punishment</a:t>
+            </a:r>
+          </a:p>
+          <a:p>
+            <a:pPr lvl="1"/>
+            <a:r>
+              <a:rPr lang="en-CA" dirty="0" smtClean="0">
+                <a:latin typeface="Avenir LT Std 45 Book" pitchFamily="34" charset="0"/>
+              </a:rPr>
+              <a:t>Outcome: A state’s murder rate</a:t>
             </a:r>
             <a:endParaRPr lang="en-CA" dirty="0">
               <a:latin typeface="Avenir LT Std 45 Book" pitchFamily="34" charset="0"/>
@@ -9040,7 +12230,7 @@
     </p:spTree>
     <p:extLst>
       <p:ext uri="{BB962C8B-B14F-4D97-AF65-F5344CB8AC3E}">
-        <p14:creationId xmlns:p14="http://schemas.microsoft.com/office/powerpoint/2010/main" val="3632345298"/>
+        <p14:creationId xmlns:p14="http://schemas.microsoft.com/office/powerpoint/2010/main" val="450253719"/>
       </p:ext>
     </p:extLst>
   </p:cSld>
@@ -9091,16 +12281,14 @@
           </a:xfrm>
         </p:spPr>
         <p:txBody>
-          <a:bodyPr>
-            <a:normAutofit/>
-          </a:bodyPr>
+          <a:bodyPr/>
           <a:lstStyle/>
           <a:p>
             <a:r>
               <a:rPr lang="en-CA" dirty="0" smtClean="0">
                 <a:latin typeface="+mn-lt"/>
               </a:rPr>
-              <a:t>Association vs. Causation</a:t>
+              <a:t>Causality</a:t>
             </a:r>
             <a:endParaRPr lang="en-CA" dirty="0">
               <a:latin typeface="+mn-lt"/>
@@ -9121,96 +12309,102 @@
         <p:spPr>
           <a:xfrm>
             <a:off x="457200" y="1756947"/>
-            <a:ext cx="8286750" cy="3596103"/>
+            <a:ext cx="8286750" cy="3919953"/>
           </a:xfrm>
         </p:spPr>
         <p:txBody>
-          <a:bodyPr/>
+          <a:bodyPr>
+            <a:normAutofit lnSpcReduction="10000"/>
+          </a:bodyPr>
           <a:lstStyle/>
           <a:p>
             <a:r>
               <a:rPr lang="en-CA" dirty="0" smtClean="0">
                 <a:latin typeface="Avenir LT Std 45 Book" pitchFamily="34" charset="0"/>
               </a:rPr>
-              <a:t>Two variables being associated does </a:t>
+              <a:t>Association: Any relationship between the treatment and outcome (i.e., there is a </a:t>
             </a:r>
             <a:r>
               <a:rPr lang="en-CA" b="1" dirty="0" smtClean="0">
                 <a:latin typeface="Avenir LT Std 45 Book" pitchFamily="34" charset="0"/>
               </a:rPr>
-              <a:t>not</a:t>
+              <a:t>correlation</a:t>
             </a:r>
             <a:r>
               <a:rPr lang="en-CA" dirty="0" smtClean="0">
                 <a:latin typeface="Avenir LT Std 45 Book" pitchFamily="34" charset="0"/>
               </a:rPr>
-              <a:t> mean one causes the other!!</a:t>
-            </a:r>
-          </a:p>
-          <a:p>
-            <a:r>
-              <a:rPr lang="en-CA" dirty="0">
-                <a:latin typeface="Avenir LT Std 45 Book" pitchFamily="34" charset="0"/>
-              </a:rPr>
-              <a:t>Example</a:t>
-            </a:r>
+              <a:t> between them)</a:t>
+            </a:r>
+          </a:p>
+          <a:p>
             <a:r>
               <a:rPr lang="en-CA" dirty="0" smtClean="0">
                 <a:latin typeface="Avenir LT Std 45 Book" pitchFamily="34" charset="0"/>
               </a:rPr>
-              <a:t>: Study </a:t>
-            </a:r>
-            <a:r>
-              <a:rPr lang="en-CA" dirty="0">
+              <a:t>Causation: The treatment </a:t>
+            </a:r>
+            <a:r>
+              <a:rPr lang="en-CA" i="1" dirty="0" smtClean="0">
                 <a:latin typeface="Avenir LT Std 45 Book" pitchFamily="34" charset="0"/>
               </a:rPr>
-              <a:t>the effect of capital punishment on a state’s murder </a:t>
+              <a:t>causes</a:t>
             </a:r>
             <a:r>
               <a:rPr lang="en-CA" dirty="0" smtClean="0">
                 <a:latin typeface="Avenir LT Std 45 Book" pitchFamily="34" charset="0"/>
               </a:rPr>
-              <a:t>rate</a:t>
+              <a:t> the outcome</a:t>
             </a:r>
           </a:p>
           <a:p>
             <a:pPr lvl="1"/>
+            <a:r>
+              <a:rPr lang="en-CA" b="1" dirty="0" smtClean="0">
+                <a:latin typeface="Avenir LT Std 45 Book" pitchFamily="34" charset="0"/>
+              </a:rPr>
+              <a:t>Association does not imply causation!!!!</a:t>
+            </a:r>
             <a:r>
               <a:rPr lang="en-CA" dirty="0" smtClean="0">
                 <a:latin typeface="Avenir LT Std 45 Book" pitchFamily="34" charset="0"/>
               </a:rPr>
-              <a:t>Even if states with capital punishments also have high murder rates, it does </a:t>
-            </a:r>
-            <a:r>
-              <a:rPr lang="en-CA" b="1" dirty="0" smtClean="0">
-                <a:latin typeface="Avenir LT Std 45 Book" pitchFamily="34" charset="0"/>
-              </a:rPr>
-              <a:t>not</a:t>
-            </a:r>
+              <a:t>	</a:t>
+            </a:r>
+          </a:p>
+          <a:p>
+            <a:pPr marL="0" indent="0">
+              <a:buNone/>
+            </a:pPr>
+            <a:endParaRPr lang="en-CA" dirty="0" smtClean="0">
+              <a:latin typeface="Avenir LT Std 45 Book" pitchFamily="34" charset="0"/>
+            </a:endParaRPr>
+          </a:p>
+          <a:p>
             <a:r>
               <a:rPr lang="en-CA" dirty="0" smtClean="0">
                 <a:latin typeface="Avenir LT Std 45 Book" pitchFamily="34" charset="0"/>
               </a:rPr>
-              <a:t> mean having capital punishment</a:t>
-            </a:r>
-            <a:r>
-              <a:rPr lang="en-CA" i="1" dirty="0" smtClean="0">
-                <a:latin typeface="Avenir LT Std 45 Book" pitchFamily="34" charset="0"/>
-              </a:rPr>
-              <a:t> causes</a:t>
-            </a:r>
+              <a:t>Example: Study the effect of capital punishment on a state’s murder rate</a:t>
+            </a:r>
+          </a:p>
+          <a:p>
+            <a:pPr lvl="1"/>
             <a:r>
               <a:rPr lang="en-CA" dirty="0" smtClean="0">
                 <a:latin typeface="Avenir LT Std 45 Book" pitchFamily="34" charset="0"/>
               </a:rPr>
-              <a:t> them to have high murder rates</a:t>
-            </a:r>
-            <a:endParaRPr lang="en-CA" dirty="0" smtClean="0">
-              <a:latin typeface="Avenir LT Std 45 Book" pitchFamily="34" charset="0"/>
-            </a:endParaRPr>
+              <a:t>Association: Most states who have capital punishment also have high murder rate</a:t>
+            </a:r>
           </a:p>
           <a:p>
             <a:pPr lvl="1"/>
+            <a:r>
+              <a:rPr lang="en-CA" dirty="0" smtClean="0">
+                <a:latin typeface="Avenir LT Std 45 Book" pitchFamily="34" charset="0"/>
+              </a:rPr>
+              <a:t>Outcome: Having capital punishment causes states to have high murder rate</a:t>
+            </a:r>
             <a:endParaRPr lang="en-CA" dirty="0">
               <a:latin typeface="Avenir LT Std 45 Book" pitchFamily="34" charset="0"/>
             </a:endParaRPr>
@@ -9288,39 +12482,110 @@
           </a:p>
         </p:txBody>
       </p:sp>
-      <p:pic>
-        <p:nvPicPr>
-          <p:cNvPr id="4" name="Content Placeholder 3"/>
-          <p:cNvPicPr>
-            <a:picLocks noGrp="1" noChangeAspect="1"/>
-          </p:cNvPicPr>
+      <p:sp>
+        <p:nvSpPr>
+          <p:cNvPr id="3" name="Content Placeholder 2"/>
+          <p:cNvSpPr>
+            <a:spLocks noGrp="1"/>
+          </p:cNvSpPr>
           <p:nvPr>
             <p:ph idx="1"/>
           </p:nvPr>
-        </p:nvPicPr>
-        <p:blipFill>
-          <a:blip r:embed="rId2">
-            <a:extLst>
-              <a:ext uri="{28A0092B-C50C-407E-A947-70E740481C1C}">
-                <a14:useLocalDpi xmlns:a14="http://schemas.microsoft.com/office/drawing/2010/main" val="0"/>
-              </a:ext>
-            </a:extLst>
-          </a:blip>
-          <a:stretch>
-            <a:fillRect/>
-          </a:stretch>
-        </p:blipFill>
+        </p:nvSpPr>
         <p:spPr>
           <a:xfrm>
-            <a:off x="457200" y="1921761"/>
-            <a:ext cx="8286750" cy="3266891"/>
-          </a:xfrm>
-        </p:spPr>
-      </p:pic>
+            <a:off x="457200" y="1756947"/>
+            <a:ext cx="8286750" cy="3596103"/>
+          </a:xfrm>
+        </p:spPr>
+        <p:txBody>
+          <a:bodyPr/>
+          <a:lstStyle/>
+          <a:p>
+            <a:r>
+              <a:rPr lang="en-CA" dirty="0" smtClean="0">
+                <a:latin typeface="Avenir LT Std 45 Book" pitchFamily="34" charset="0"/>
+              </a:rPr>
+              <a:t>Two variables being associated does </a:t>
+            </a:r>
+            <a:r>
+              <a:rPr lang="en-CA" b="1" dirty="0" smtClean="0">
+                <a:latin typeface="Avenir LT Std 45 Book" pitchFamily="34" charset="0"/>
+              </a:rPr>
+              <a:t>not</a:t>
+            </a:r>
+            <a:r>
+              <a:rPr lang="en-CA" dirty="0" smtClean="0">
+                <a:latin typeface="Avenir LT Std 45 Book" pitchFamily="34" charset="0"/>
+              </a:rPr>
+              <a:t> mean one causes the other!!</a:t>
+            </a:r>
+          </a:p>
+          <a:p>
+            <a:r>
+              <a:rPr lang="en-CA" dirty="0">
+                <a:latin typeface="Avenir LT Std 45 Book" pitchFamily="34" charset="0"/>
+              </a:rPr>
+              <a:t>Example</a:t>
+            </a:r>
+            <a:r>
+              <a:rPr lang="en-CA" dirty="0" smtClean="0">
+                <a:latin typeface="Avenir LT Std 45 Book" pitchFamily="34" charset="0"/>
+              </a:rPr>
+              <a:t>: Study </a:t>
+            </a:r>
+            <a:r>
+              <a:rPr lang="en-CA" dirty="0">
+                <a:latin typeface="Avenir LT Std 45 Book" pitchFamily="34" charset="0"/>
+              </a:rPr>
+              <a:t>the effect of capital punishment on a state’s murder </a:t>
+            </a:r>
+            <a:r>
+              <a:rPr lang="en-CA" dirty="0" smtClean="0">
+                <a:latin typeface="Avenir LT Std 45 Book" pitchFamily="34" charset="0"/>
+              </a:rPr>
+              <a:t>rate</a:t>
+            </a:r>
+          </a:p>
+          <a:p>
+            <a:pPr lvl="1"/>
+            <a:r>
+              <a:rPr lang="en-CA" dirty="0" smtClean="0">
+                <a:latin typeface="Avenir LT Std 45 Book" pitchFamily="34" charset="0"/>
+              </a:rPr>
+              <a:t>Even if states with capital punishments also have high murder rates, it does </a:t>
+            </a:r>
+            <a:r>
+              <a:rPr lang="en-CA" b="1" dirty="0" smtClean="0">
+                <a:latin typeface="Avenir LT Std 45 Book" pitchFamily="34" charset="0"/>
+              </a:rPr>
+              <a:t>not</a:t>
+            </a:r>
+            <a:r>
+              <a:rPr lang="en-CA" dirty="0" smtClean="0">
+                <a:latin typeface="Avenir LT Std 45 Book" pitchFamily="34" charset="0"/>
+              </a:rPr>
+              <a:t> mean having capital punishment</a:t>
+            </a:r>
+            <a:r>
+              <a:rPr lang="en-CA" i="1" dirty="0" smtClean="0">
+                <a:latin typeface="Avenir LT Std 45 Book" pitchFamily="34" charset="0"/>
+              </a:rPr>
+              <a:t> causes</a:t>
+            </a:r>
+            <a:r>
+              <a:rPr lang="en-CA" dirty="0" smtClean="0">
+                <a:latin typeface="Avenir LT Std 45 Book" pitchFamily="34" charset="0"/>
+              </a:rPr>
+              <a:t> them to have high murder rates</a:t>
+            </a:r>
+          </a:p>
+        </p:txBody>
+      </p:sp>
     </p:spTree>
     <p:extLst>
       <p:ext uri="{BB962C8B-B14F-4D97-AF65-F5344CB8AC3E}">
-        <p14:creationId xmlns:p14="http://schemas.microsoft.com/office/powerpoint/2010/main" val="3363855638"/>
+        <p14:creationId xmlns:p14="http://schemas.microsoft.com/office/powerpoint/2010/main" val="3632345298"/>
       </p:ext>
     </p:extLst>
   </p:cSld>
@@ -9388,39 +12653,109 @@
           </a:p>
         </p:txBody>
       </p:sp>
-      <p:pic>
-        <p:nvPicPr>
-          <p:cNvPr id="7" name="Content Placeholder 6"/>
-          <p:cNvPicPr>
-            <a:picLocks noGrp="1" noChangeAspect="1"/>
-          </p:cNvPicPr>
+      <p:sp>
+        <p:nvSpPr>
+          <p:cNvPr id="3" name="Content Placeholder 2"/>
+          <p:cNvSpPr>
+            <a:spLocks noGrp="1"/>
+          </p:cNvSpPr>
           <p:nvPr>
             <p:ph idx="1"/>
           </p:nvPr>
-        </p:nvPicPr>
-        <p:blipFill>
-          <a:blip r:embed="rId2">
-            <a:extLst>
-              <a:ext uri="{28A0092B-C50C-407E-A947-70E740481C1C}">
-                <a14:useLocalDpi xmlns:a14="http://schemas.microsoft.com/office/drawing/2010/main" val="0"/>
-              </a:ext>
-            </a:extLst>
-          </a:blip>
-          <a:stretch>
-            <a:fillRect/>
-          </a:stretch>
-        </p:blipFill>
+        </p:nvSpPr>
         <p:spPr>
           <a:xfrm>
-            <a:off x="457200" y="1921761"/>
-            <a:ext cx="8286750" cy="3266891"/>
-          </a:xfrm>
-        </p:spPr>
-      </p:pic>
+            <a:off x="457200" y="1756947"/>
+            <a:ext cx="8286750" cy="3596103"/>
+          </a:xfrm>
+        </p:spPr>
+        <p:txBody>
+          <a:bodyPr/>
+          <a:lstStyle/>
+          <a:p>
+            <a:r>
+              <a:rPr lang="en-CA" dirty="0" smtClean="0">
+                <a:latin typeface="Avenir LT Std 45 Book" pitchFamily="34" charset="0"/>
+              </a:rPr>
+              <a:t>Confounding Factors: Other variables unaccounted for in relationship between treatment and outcome</a:t>
+            </a:r>
+          </a:p>
+          <a:p>
+            <a:r>
+              <a:rPr lang="en-CA" dirty="0">
+                <a:latin typeface="Avenir LT Std 45 Book" pitchFamily="34" charset="0"/>
+              </a:rPr>
+              <a:t>Example</a:t>
+            </a:r>
+            <a:r>
+              <a:rPr lang="en-CA" dirty="0" smtClean="0">
+                <a:latin typeface="Avenir LT Std 45 Book" pitchFamily="34" charset="0"/>
+              </a:rPr>
+              <a:t>: Study </a:t>
+            </a:r>
+            <a:r>
+              <a:rPr lang="en-CA" dirty="0">
+                <a:latin typeface="Avenir LT Std 45 Book" pitchFamily="34" charset="0"/>
+              </a:rPr>
+              <a:t>the effect of capital punishment on a state’s murder </a:t>
+            </a:r>
+            <a:r>
+              <a:rPr lang="en-CA" dirty="0" smtClean="0">
+                <a:latin typeface="Avenir LT Std 45 Book" pitchFamily="34" charset="0"/>
+              </a:rPr>
+              <a:t>rate</a:t>
+            </a:r>
+          </a:p>
+          <a:p>
+            <a:pPr lvl="1"/>
+            <a:r>
+              <a:rPr lang="en-CA" dirty="0" smtClean="0">
+                <a:latin typeface="Avenir LT Std 45 Book" pitchFamily="34" charset="0"/>
+              </a:rPr>
+              <a:t>Lots of other possible explanations: literacy rates, living standards, unemployment, gun control</a:t>
+            </a:r>
+          </a:p>
+          <a:p>
+            <a:pPr lvl="1"/>
+            <a:r>
+              <a:rPr lang="en-CA" dirty="0" smtClean="0">
+                <a:latin typeface="Avenir LT Std 45 Book" pitchFamily="34" charset="0"/>
+              </a:rPr>
+              <a:t>We do not know which one </a:t>
+            </a:r>
+            <a:r>
+              <a:rPr lang="en-CA" i="1" dirty="0" smtClean="0">
+                <a:latin typeface="Avenir LT Std 45 Book" pitchFamily="34" charset="0"/>
+              </a:rPr>
+              <a:t>causes</a:t>
+            </a:r>
+            <a:r>
+              <a:rPr lang="en-CA" dirty="0" smtClean="0">
+                <a:latin typeface="Avenir LT Std 45 Book" pitchFamily="34" charset="0"/>
+              </a:rPr>
+              <a:t> higher murder rates</a:t>
+            </a:r>
+            <a:endParaRPr lang="en-CA" dirty="0">
+              <a:latin typeface="Avenir LT Std 45 Book" pitchFamily="34" charset="0"/>
+            </a:endParaRPr>
+          </a:p>
+          <a:p>
+            <a:endParaRPr lang="en-CA" dirty="0" smtClean="0">
+              <a:latin typeface="Avenir LT Std 45 Book" pitchFamily="34" charset="0"/>
+            </a:endParaRPr>
+          </a:p>
+          <a:p>
+            <a:pPr lvl="1"/>
+            <a:endParaRPr lang="en-CA" dirty="0">
+              <a:latin typeface="Avenir LT Std 45 Book" pitchFamily="34" charset="0"/>
+            </a:endParaRPr>
+          </a:p>
+        </p:txBody>
+      </p:sp>
     </p:spTree>
     <p:extLst>
       <p:ext uri="{BB962C8B-B14F-4D97-AF65-F5344CB8AC3E}">
-        <p14:creationId xmlns:p14="http://schemas.microsoft.com/office/powerpoint/2010/main" val="3363855638"/>
+        <p14:creationId xmlns:p14="http://schemas.microsoft.com/office/powerpoint/2010/main" val="2817558828"/>
       </p:ext>
     </p:extLst>
   </p:cSld>
@@ -9590,7 +12925,7 @@
       </p:sp>
       <p:pic>
         <p:nvPicPr>
-          <p:cNvPr id="5" name="Content Placeholder 4"/>
+          <p:cNvPr id="7" name="Content Placeholder 6"/>
           <p:cNvPicPr>
             <a:picLocks noGrp="1" noChangeAspect="1"/>
           </p:cNvPicPr>
@@ -9620,7 +12955,7 @@
     </p:spTree>
     <p:extLst>
       <p:ext uri="{BB962C8B-B14F-4D97-AF65-F5344CB8AC3E}">
-        <p14:creationId xmlns:p14="http://schemas.microsoft.com/office/powerpoint/2010/main" val="3377257628"/>
+        <p14:creationId xmlns:p14="http://schemas.microsoft.com/office/powerpoint/2010/main" val="3363855638"/>
       </p:ext>
     </p:extLst>
   </p:cSld>
@@ -9688,112 +13023,39 @@
           </a:p>
         </p:txBody>
       </p:sp>
-      <p:sp>
-        <p:nvSpPr>
-          <p:cNvPr id="3" name="Content Placeholder 2"/>
-          <p:cNvSpPr>
-            <a:spLocks noGrp="1"/>
-          </p:cNvSpPr>
+      <p:pic>
+        <p:nvPicPr>
+          <p:cNvPr id="4" name="Content Placeholder 3"/>
+          <p:cNvPicPr>
+            <a:picLocks noGrp="1" noChangeAspect="1"/>
+          </p:cNvPicPr>
           <p:nvPr>
             <p:ph idx="1"/>
           </p:nvPr>
-        </p:nvSpPr>
+        </p:nvPicPr>
+        <p:blipFill>
+          <a:blip r:embed="rId2">
+            <a:extLst>
+              <a:ext uri="{28A0092B-C50C-407E-A947-70E740481C1C}">
+                <a14:useLocalDpi xmlns:a14="http://schemas.microsoft.com/office/drawing/2010/main" val="0"/>
+              </a:ext>
+            </a:extLst>
+          </a:blip>
+          <a:stretch>
+            <a:fillRect/>
+          </a:stretch>
+        </p:blipFill>
         <p:spPr>
           <a:xfrm>
-            <a:off x="457200" y="1756947"/>
-            <a:ext cx="8286750" cy="3596103"/>
-          </a:xfrm>
-        </p:spPr>
-        <p:txBody>
-          <a:bodyPr/>
-          <a:lstStyle/>
-          <a:p>
-            <a:r>
-              <a:rPr lang="en-CA" dirty="0" smtClean="0">
-                <a:latin typeface="Avenir LT Std 45 Book" pitchFamily="34" charset="0"/>
-              </a:rPr>
-              <a:t>Confounding Factors: Other variables unaccounted for in relationship between treatment and outcome</a:t>
-            </a:r>
-            <a:endParaRPr lang="en-CA" dirty="0" smtClean="0">
-              <a:latin typeface="Avenir LT Std 45 Book" pitchFamily="34" charset="0"/>
-            </a:endParaRPr>
-          </a:p>
-          <a:p>
-            <a:r>
-              <a:rPr lang="en-CA" dirty="0">
-                <a:latin typeface="Avenir LT Std 45 Book" pitchFamily="34" charset="0"/>
-              </a:rPr>
-              <a:t>Example</a:t>
-            </a:r>
-            <a:r>
-              <a:rPr lang="en-CA" dirty="0" smtClean="0">
-                <a:latin typeface="Avenir LT Std 45 Book" pitchFamily="34" charset="0"/>
-              </a:rPr>
-              <a:t>: Study </a:t>
-            </a:r>
-            <a:r>
-              <a:rPr lang="en-CA" dirty="0">
-                <a:latin typeface="Avenir LT Std 45 Book" pitchFamily="34" charset="0"/>
-              </a:rPr>
-              <a:t>the effect of capital punishment on a state’s murder </a:t>
-            </a:r>
-            <a:r>
-              <a:rPr lang="en-CA" dirty="0" smtClean="0">
-                <a:latin typeface="Avenir LT Std 45 Book" pitchFamily="34" charset="0"/>
-              </a:rPr>
-              <a:t>rate</a:t>
-            </a:r>
-          </a:p>
-          <a:p>
-            <a:pPr lvl="1"/>
-            <a:r>
-              <a:rPr lang="en-CA" dirty="0" smtClean="0">
-                <a:latin typeface="Avenir LT Std 45 Book" pitchFamily="34" charset="0"/>
-              </a:rPr>
-              <a:t>Lots of other possible explanations: literacy rates, living standards, unemployment, gun control</a:t>
-            </a:r>
-          </a:p>
-          <a:p>
-            <a:pPr lvl="1"/>
-            <a:r>
-              <a:rPr lang="en-CA" dirty="0" smtClean="0">
-                <a:latin typeface="Avenir LT Std 45 Book" pitchFamily="34" charset="0"/>
-              </a:rPr>
-              <a:t>We do not know which one </a:t>
-            </a:r>
-            <a:r>
-              <a:rPr lang="en-CA" i="1" dirty="0" smtClean="0">
-                <a:latin typeface="Avenir LT Std 45 Book" pitchFamily="34" charset="0"/>
-              </a:rPr>
-              <a:t>causes</a:t>
-            </a:r>
-            <a:r>
-              <a:rPr lang="en-CA" dirty="0" smtClean="0">
-                <a:latin typeface="Avenir LT Std 45 Book" pitchFamily="34" charset="0"/>
-              </a:rPr>
-              <a:t> higher murder rates</a:t>
-            </a:r>
-            <a:endParaRPr lang="en-CA" dirty="0">
-              <a:latin typeface="Avenir LT Std 45 Book" pitchFamily="34" charset="0"/>
-            </a:endParaRPr>
-          </a:p>
-          <a:p>
-            <a:endParaRPr lang="en-CA" dirty="0" smtClean="0">
-              <a:latin typeface="Avenir LT Std 45 Book" pitchFamily="34" charset="0"/>
-            </a:endParaRPr>
-          </a:p>
-          <a:p>
-            <a:pPr lvl="1"/>
-            <a:endParaRPr lang="en-CA" dirty="0">
-              <a:latin typeface="Avenir LT Std 45 Book" pitchFamily="34" charset="0"/>
-            </a:endParaRPr>
-          </a:p>
-        </p:txBody>
-      </p:sp>
+            <a:off x="457200" y="1921761"/>
+            <a:ext cx="8286750" cy="3266891"/>
+          </a:xfrm>
+        </p:spPr>
+      </p:pic>
     </p:spTree>
     <p:extLst>
       <p:ext uri="{BB962C8B-B14F-4D97-AF65-F5344CB8AC3E}">
-        <p14:creationId xmlns:p14="http://schemas.microsoft.com/office/powerpoint/2010/main" val="2817558828"/>
+        <p14:creationId xmlns:p14="http://schemas.microsoft.com/office/powerpoint/2010/main" val="3363855638"/>
       </p:ext>
     </p:extLst>
   </p:cSld>

</xml_diff>